<commit_message>
Minor edit to OO background
</commit_message>
<xml_diff>
--- a/slides/2_oo_background.pptx
+++ b/slides/2_oo_background.pptx
@@ -5,10 +5,10 @@
     <p:sldMasterId id="2147483704" r:id="rId1"/>
   </p:sldMasterIdLst>
   <p:notesMasterIdLst>
-    <p:notesMasterId r:id="rId45"/>
+    <p:notesMasterId r:id="rId47"/>
   </p:notesMasterIdLst>
   <p:handoutMasterIdLst>
-    <p:handoutMasterId r:id="rId46"/>
+    <p:handoutMasterId r:id="rId48"/>
   </p:handoutMasterIdLst>
   <p:sldIdLst>
     <p:sldId id="256" r:id="rId2"/>
@@ -27,33 +27,35 @@
     <p:sldId id="282" r:id="rId15"/>
     <p:sldId id="286" r:id="rId16"/>
     <p:sldId id="283" r:id="rId17"/>
-    <p:sldId id="330" r:id="rId18"/>
-    <p:sldId id="331" r:id="rId19"/>
-    <p:sldId id="332" r:id="rId20"/>
-    <p:sldId id="333" r:id="rId21"/>
-    <p:sldId id="335" r:id="rId22"/>
-    <p:sldId id="336" r:id="rId23"/>
-    <p:sldId id="337" r:id="rId24"/>
-    <p:sldId id="338" r:id="rId25"/>
-    <p:sldId id="339" r:id="rId26"/>
-    <p:sldId id="340" r:id="rId27"/>
-    <p:sldId id="341" r:id="rId28"/>
-    <p:sldId id="342" r:id="rId29"/>
-    <p:sldId id="328" r:id="rId30"/>
-    <p:sldId id="343" r:id="rId31"/>
-    <p:sldId id="345" r:id="rId32"/>
-    <p:sldId id="346" r:id="rId33"/>
-    <p:sldId id="347" r:id="rId34"/>
-    <p:sldId id="348" r:id="rId35"/>
-    <p:sldId id="349" r:id="rId36"/>
-    <p:sldId id="344" r:id="rId37"/>
-    <p:sldId id="316" r:id="rId38"/>
-    <p:sldId id="317" r:id="rId39"/>
-    <p:sldId id="318" r:id="rId40"/>
-    <p:sldId id="321" r:id="rId41"/>
-    <p:sldId id="320" r:id="rId42"/>
-    <p:sldId id="287" r:id="rId43"/>
-    <p:sldId id="260" r:id="rId44"/>
+    <p:sldId id="351" r:id="rId18"/>
+    <p:sldId id="330" r:id="rId19"/>
+    <p:sldId id="331" r:id="rId20"/>
+    <p:sldId id="332" r:id="rId21"/>
+    <p:sldId id="333" r:id="rId22"/>
+    <p:sldId id="335" r:id="rId23"/>
+    <p:sldId id="336" r:id="rId24"/>
+    <p:sldId id="337" r:id="rId25"/>
+    <p:sldId id="338" r:id="rId26"/>
+    <p:sldId id="339" r:id="rId27"/>
+    <p:sldId id="340" r:id="rId28"/>
+    <p:sldId id="341" r:id="rId29"/>
+    <p:sldId id="342" r:id="rId30"/>
+    <p:sldId id="328" r:id="rId31"/>
+    <p:sldId id="343" r:id="rId32"/>
+    <p:sldId id="345" r:id="rId33"/>
+    <p:sldId id="346" r:id="rId34"/>
+    <p:sldId id="347" r:id="rId35"/>
+    <p:sldId id="348" r:id="rId36"/>
+    <p:sldId id="349" r:id="rId37"/>
+    <p:sldId id="344" r:id="rId38"/>
+    <p:sldId id="316" r:id="rId39"/>
+    <p:sldId id="317" r:id="rId40"/>
+    <p:sldId id="318" r:id="rId41"/>
+    <p:sldId id="321" r:id="rId42"/>
+    <p:sldId id="320" r:id="rId43"/>
+    <p:sldId id="350" r:id="rId44"/>
+    <p:sldId id="287" r:id="rId45"/>
+    <p:sldId id="260" r:id="rId46"/>
   </p:sldIdLst>
   <p:sldSz cx="12192000" cy="6858000"/>
   <p:notesSz cx="6858000" cy="9144000"/>
@@ -303,7 +305,7 @@
           <a:p>
             <a:fld id="{E1249EDF-C441-401E-BE19-3A9BC3A020D4}" type="datetimeFigureOut">
               <a:rPr lang="en-US" smtClean="0"/>
-              <a:t>9/25/2025</a:t>
+              <a:t>9/26/2025</a:t>
             </a:fld>
             <a:endParaRPr lang="en-US"/>
           </a:p>
@@ -481,7 +483,7 @@
           <a:p>
             <a:fld id="{EC53C71B-473E-4814-B444-77926C773EE5}" type="datetimeFigureOut">
               <a:rPr lang="en-US" smtClean="0"/>
-              <a:t>9/25/2025</a:t>
+              <a:t>9/26/2025</a:t>
             </a:fld>
             <a:endParaRPr lang="en-US"/>
           </a:p>
@@ -1485,7 +1487,7 @@
               <a:pPr>
                 <a:defRPr/>
               </a:pPr>
-              <a:t>Thursday, September 25, 2025</a:t>
+              <a:t>Friday, September 26, 2025</a:t>
             </a:fld>
             <a:endParaRPr lang="en-US" dirty="0"/>
           </a:p>
@@ -1699,7 +1701,7 @@
               <a:pPr>
                 <a:defRPr/>
               </a:pPr>
-              <a:t>Thursday, September 25, 2025</a:t>
+              <a:t>Friday, September 26, 2025</a:t>
             </a:fld>
             <a:endParaRPr lang="en-US" dirty="0"/>
           </a:p>
@@ -2114,7 +2116,7 @@
               <a:pPr>
                 <a:defRPr/>
               </a:pPr>
-              <a:t>Thursday, September 25, 2025</a:t>
+              <a:t>Friday, September 26, 2025</a:t>
             </a:fld>
             <a:endParaRPr lang="en-US" dirty="0"/>
           </a:p>
@@ -2474,7 +2476,7 @@
               <a:pPr>
                 <a:defRPr/>
               </a:pPr>
-              <a:t>Thursday, September 25, 2025</a:t>
+              <a:t>Friday, September 26, 2025</a:t>
             </a:fld>
             <a:endParaRPr lang="en-US" dirty="0"/>
           </a:p>
@@ -2752,7 +2754,7 @@
               <a:pPr>
                 <a:defRPr/>
               </a:pPr>
-              <a:t>Thursday, September 25, 2025</a:t>
+              <a:t>Friday, September 26, 2025</a:t>
             </a:fld>
             <a:endParaRPr lang="en-US" dirty="0"/>
           </a:p>
@@ -3036,7 +3038,7 @@
               <a:pPr>
                 <a:defRPr/>
               </a:pPr>
-              <a:t>Thursday, September 25, 2025</a:t>
+              <a:t>Friday, September 26, 2025</a:t>
             </a:fld>
             <a:endParaRPr lang="en-US" dirty="0"/>
           </a:p>
@@ -3861,7 +3863,7 @@
               <a:pPr>
                 <a:defRPr/>
               </a:pPr>
-              <a:t>Thursday, September 25, 2025</a:t>
+              <a:t>Friday, September 26, 2025</a:t>
             </a:fld>
             <a:endParaRPr lang="en-US" dirty="0"/>
           </a:p>
@@ -10122,6 +10124,232 @@
       </p:grpSpPr>
       <p:sp>
         <p:nvSpPr>
+          <p:cNvPr id="5" name="Content Placeholder 4">
+            <a:extLst>
+              <a:ext uri="{FF2B5EF4-FFF2-40B4-BE49-F238E27FC236}">
+                <a16:creationId xmlns:a16="http://schemas.microsoft.com/office/drawing/2014/main" id="{5E378CC6-882E-4694-944C-D68105AC20D9}"/>
+              </a:ext>
+            </a:extLst>
+          </p:cNvPr>
+          <p:cNvSpPr>
+            <a:spLocks noGrp="1"/>
+          </p:cNvSpPr>
+          <p:nvPr>
+            <p:ph idx="1"/>
+          </p:nvPr>
+        </p:nvSpPr>
+        <p:spPr/>
+        <p:txBody>
+          <a:bodyPr/>
+          <a:lstStyle/>
+          <a:p>
+            <a:r>
+              <a:rPr lang="en-US" dirty="0"/>
+              <a:t>What is a library?</a:t>
+            </a:r>
+          </a:p>
+          <a:p>
+            <a:r>
+              <a:rPr lang="en-US" dirty="0"/>
+              <a:t>How is it different from an application?</a:t>
+            </a:r>
+          </a:p>
+          <a:p>
+            <a:r>
+              <a:rPr lang="en-US" dirty="0"/>
+              <a:t>What are the challenges of library design vs. application design?</a:t>
+            </a:r>
+          </a:p>
+        </p:txBody>
+      </p:sp>
+      <p:sp>
+        <p:nvSpPr>
+          <p:cNvPr id="4" name="Title 3">
+            <a:extLst>
+              <a:ext uri="{FF2B5EF4-FFF2-40B4-BE49-F238E27FC236}">
+                <a16:creationId xmlns:a16="http://schemas.microsoft.com/office/drawing/2014/main" id="{5BA7E008-FF29-BA69-2090-2D5D4F3C74A8}"/>
+              </a:ext>
+            </a:extLst>
+          </p:cNvPr>
+          <p:cNvSpPr>
+            <a:spLocks noGrp="1"/>
+          </p:cNvSpPr>
+          <p:nvPr>
+            <p:ph type="title"/>
+          </p:nvPr>
+        </p:nvSpPr>
+        <p:spPr/>
+        <p:txBody>
+          <a:bodyPr/>
+          <a:lstStyle/>
+          <a:p>
+            <a:r>
+              <a:rPr lang="en-US" dirty="0"/>
+              <a:t>Library vs application</a:t>
+            </a:r>
+          </a:p>
+        </p:txBody>
+      </p:sp>
+    </p:spTree>
+    <p:extLst>
+      <p:ext uri="{BB962C8B-B14F-4D97-AF65-F5344CB8AC3E}">
+        <p14:creationId xmlns:p14="http://schemas.microsoft.com/office/powerpoint/2010/main" val="3405614452"/>
+      </p:ext>
+    </p:extLst>
+  </p:cSld>
+  <p:clrMapOvr>
+    <a:masterClrMapping/>
+  </p:clrMapOvr>
+  <p:timing>
+    <p:tnLst>
+      <p:par>
+        <p:cTn id="1" dur="indefinite" restart="never" nodeType="tmRoot">
+          <p:childTnLst>
+            <p:seq concurrent="1" nextAc="seek">
+              <p:cTn id="2" dur="indefinite" nodeType="mainSeq">
+                <p:childTnLst>
+                  <p:par>
+                    <p:cTn id="3" fill="hold">
+                      <p:stCondLst>
+                        <p:cond delay="indefinite"/>
+                      </p:stCondLst>
+                      <p:childTnLst>
+                        <p:par>
+                          <p:cTn id="4" fill="hold">
+                            <p:stCondLst>
+                              <p:cond delay="0"/>
+                            </p:stCondLst>
+                            <p:childTnLst>
+                              <p:par>
+                                <p:cTn id="5" presetID="1" presetClass="entr" presetSubtype="0" fill="hold" nodeType="clickEffect">
+                                  <p:stCondLst>
+                                    <p:cond delay="0"/>
+                                  </p:stCondLst>
+                                  <p:childTnLst>
+                                    <p:set>
+                                      <p:cBhvr>
+                                        <p:cTn id="6" dur="1" fill="hold">
+                                          <p:stCondLst>
+                                            <p:cond delay="0"/>
+                                          </p:stCondLst>
+                                        </p:cTn>
+                                        <p:tgtEl>
+                                          <p:spTgt spid="5">
+                                            <p:txEl>
+                                              <p:pRg st="1" end="1"/>
+                                            </p:txEl>
+                                          </p:spTgt>
+                                        </p:tgtEl>
+                                        <p:attrNameLst>
+                                          <p:attrName>style.visibility</p:attrName>
+                                        </p:attrNameLst>
+                                      </p:cBhvr>
+                                      <p:to>
+                                        <p:strVal val="visible"/>
+                                      </p:to>
+                                    </p:set>
+                                  </p:childTnLst>
+                                </p:cTn>
+                              </p:par>
+                            </p:childTnLst>
+                          </p:cTn>
+                        </p:par>
+                      </p:childTnLst>
+                    </p:cTn>
+                  </p:par>
+                  <p:par>
+                    <p:cTn id="7" fill="hold">
+                      <p:stCondLst>
+                        <p:cond delay="indefinite"/>
+                      </p:stCondLst>
+                      <p:childTnLst>
+                        <p:par>
+                          <p:cTn id="8" fill="hold">
+                            <p:stCondLst>
+                              <p:cond delay="0"/>
+                            </p:stCondLst>
+                            <p:childTnLst>
+                              <p:par>
+                                <p:cTn id="9" presetID="1" presetClass="entr" presetSubtype="0" fill="hold" nodeType="clickEffect">
+                                  <p:stCondLst>
+                                    <p:cond delay="0"/>
+                                  </p:stCondLst>
+                                  <p:childTnLst>
+                                    <p:set>
+                                      <p:cBhvr>
+                                        <p:cTn id="10" dur="1" fill="hold">
+                                          <p:stCondLst>
+                                            <p:cond delay="0"/>
+                                          </p:stCondLst>
+                                        </p:cTn>
+                                        <p:tgtEl>
+                                          <p:spTgt spid="5">
+                                            <p:txEl>
+                                              <p:pRg st="2" end="2"/>
+                                            </p:txEl>
+                                          </p:spTgt>
+                                        </p:tgtEl>
+                                        <p:attrNameLst>
+                                          <p:attrName>style.visibility</p:attrName>
+                                        </p:attrNameLst>
+                                      </p:cBhvr>
+                                      <p:to>
+                                        <p:strVal val="visible"/>
+                                      </p:to>
+                                    </p:set>
+                                  </p:childTnLst>
+                                </p:cTn>
+                              </p:par>
+                            </p:childTnLst>
+                          </p:cTn>
+                        </p:par>
+                      </p:childTnLst>
+                    </p:cTn>
+                  </p:par>
+                </p:childTnLst>
+              </p:cTn>
+              <p:prevCondLst>
+                <p:cond evt="onPrev" delay="0">
+                  <p:tgtEl>
+                    <p:sldTgt/>
+                  </p:tgtEl>
+                </p:cond>
+              </p:prevCondLst>
+              <p:nextCondLst>
+                <p:cond evt="onNext" delay="0">
+                  <p:tgtEl>
+                    <p:sldTgt/>
+                  </p:tgtEl>
+                </p:cond>
+              </p:nextCondLst>
+            </p:seq>
+          </p:childTnLst>
+        </p:cTn>
+      </p:par>
+    </p:tnLst>
+  </p:timing>
+</p:sld>
+</file>
+
+<file path=ppt/slides/slide18.xml><?xml version="1.0" encoding="utf-8"?>
+<p:sld xmlns:a="http://schemas.openxmlformats.org/drawingml/2006/main" xmlns:r="http://schemas.openxmlformats.org/officeDocument/2006/relationships" xmlns:p="http://schemas.openxmlformats.org/presentationml/2006/main">
+  <p:cSld>
+    <p:spTree>
+      <p:nvGrpSpPr>
+        <p:cNvPr id="1" name=""/>
+        <p:cNvGrpSpPr/>
+        <p:nvPr/>
+      </p:nvGrpSpPr>
+      <p:grpSpPr>
+        <a:xfrm>
+          <a:off x="0" y="0"/>
+          <a:ext cx="0" cy="0"/>
+          <a:chOff x="0" y="0"/>
+          <a:chExt cx="0" cy="0"/>
+        </a:xfrm>
+      </p:grpSpPr>
+      <p:sp>
+        <p:nvSpPr>
           <p:cNvPr id="6" name="Content Placeholder 5">
             <a:extLst>
               <a:ext uri="{FF2B5EF4-FFF2-40B4-BE49-F238E27FC236}">
@@ -10610,7 +10838,7 @@
 </p:sld>
 </file>
 
-<file path=ppt/slides/slide18.xml><?xml version="1.0" encoding="utf-8"?>
+<file path=ppt/slides/slide19.xml><?xml version="1.0" encoding="utf-8"?>
 <p:sld xmlns:a="http://schemas.openxmlformats.org/drawingml/2006/main" xmlns:r="http://schemas.openxmlformats.org/officeDocument/2006/relationships" xmlns:p="http://schemas.openxmlformats.org/presentationml/2006/main">
   <p:cSld>
     <p:spTree>
@@ -11141,7 +11369,142 @@
 </p:sld>
 </file>
 
-<file path=ppt/slides/slide19.xml><?xml version="1.0" encoding="utf-8"?>
+<file path=ppt/slides/slide2.xml><?xml version="1.0" encoding="utf-8"?>
+<p:sld xmlns:a="http://schemas.openxmlformats.org/drawingml/2006/main" xmlns:r="http://schemas.openxmlformats.org/officeDocument/2006/relationships" xmlns:p="http://schemas.openxmlformats.org/presentationml/2006/main">
+  <p:cSld>
+    <p:spTree>
+      <p:nvGrpSpPr>
+        <p:cNvPr id="1" name=""/>
+        <p:cNvGrpSpPr/>
+        <p:nvPr/>
+      </p:nvGrpSpPr>
+      <p:grpSpPr>
+        <a:xfrm>
+          <a:off x="0" y="0"/>
+          <a:ext cx="0" cy="0"/>
+          <a:chOff x="0" y="0"/>
+          <a:chExt cx="0" cy="0"/>
+        </a:xfrm>
+      </p:grpSpPr>
+      <p:sp>
+        <p:nvSpPr>
+          <p:cNvPr id="5" name="Content Placeholder 4">
+            <a:extLst>
+              <a:ext uri="{FF2B5EF4-FFF2-40B4-BE49-F238E27FC236}">
+                <a16:creationId xmlns:a16="http://schemas.microsoft.com/office/drawing/2014/main" id="{15B35FF2-444E-0C72-D2C7-F4B065A68CCB}"/>
+              </a:ext>
+            </a:extLst>
+          </p:cNvPr>
+          <p:cNvSpPr>
+            <a:spLocks noGrp="1"/>
+          </p:cNvSpPr>
+          <p:nvPr>
+            <p:ph idx="1"/>
+          </p:nvPr>
+        </p:nvSpPr>
+        <p:spPr/>
+        <p:txBody>
+          <a:bodyPr/>
+          <a:lstStyle/>
+          <a:p>
+            <a:r>
+              <a:rPr lang="en-US" dirty="0"/>
+              <a:t>HW1, HW3, and potentially some components of HW2 can be done in Rust, Java, or C++</a:t>
+            </a:r>
+          </a:p>
+          <a:p>
+            <a:pPr lvl="1"/>
+            <a:r>
+              <a:rPr lang="en-US" dirty="0"/>
+              <a:t>Part of HW2 will use Java Reflection and Annotations</a:t>
+            </a:r>
+          </a:p>
+          <a:p>
+            <a:pPr lvl="1"/>
+            <a:r>
+              <a:rPr lang="en-US" dirty="0"/>
+              <a:t>Caveats</a:t>
+            </a:r>
+          </a:p>
+          <a:p>
+            <a:pPr lvl="2"/>
+            <a:r>
+              <a:rPr lang="en-US" dirty="0"/>
+              <a:t>Only Java handout</a:t>
+            </a:r>
+          </a:p>
+          <a:p>
+            <a:pPr lvl="2"/>
+            <a:r>
+              <a:rPr lang="en-US" dirty="0"/>
+              <a:t>Fewer resources if using Rust/C++</a:t>
+            </a:r>
+          </a:p>
+          <a:p>
+            <a:pPr lvl="2"/>
+            <a:r>
+              <a:rPr lang="en-US" dirty="0"/>
+              <a:t>Using more than 95% safe Rust will have a 5% of the HW grade as extra-credit</a:t>
+            </a:r>
+          </a:p>
+          <a:p>
+            <a:r>
+              <a:rPr lang="en-US" dirty="0"/>
+              <a:t>Potentially other EC </a:t>
+            </a:r>
+            <a:r>
+              <a:rPr lang="en-US" dirty="0" err="1"/>
+              <a:t>homeworks</a:t>
+            </a:r>
+            <a:r>
+              <a:rPr lang="en-US" dirty="0"/>
+              <a:t> on Rust</a:t>
+            </a:r>
+          </a:p>
+        </p:txBody>
+      </p:sp>
+      <p:sp>
+        <p:nvSpPr>
+          <p:cNvPr id="4" name="Title 3">
+            <a:extLst>
+              <a:ext uri="{FF2B5EF4-FFF2-40B4-BE49-F238E27FC236}">
+                <a16:creationId xmlns:a16="http://schemas.microsoft.com/office/drawing/2014/main" id="{E19C93AA-7F3B-D081-D2DA-31D9CFFD1879}"/>
+              </a:ext>
+            </a:extLst>
+          </p:cNvPr>
+          <p:cNvSpPr>
+            <a:spLocks noGrp="1"/>
+          </p:cNvSpPr>
+          <p:nvPr>
+            <p:ph type="title"/>
+          </p:nvPr>
+        </p:nvSpPr>
+        <p:spPr/>
+        <p:txBody>
+          <a:bodyPr/>
+          <a:lstStyle/>
+          <a:p>
+            <a:r>
+              <a:rPr lang="en-US" dirty="0"/>
+              <a:t>Announcements</a:t>
+            </a:r>
+          </a:p>
+        </p:txBody>
+      </p:sp>
+    </p:spTree>
+    <p:extLst>
+      <p:ext uri="{BB962C8B-B14F-4D97-AF65-F5344CB8AC3E}">
+        <p14:creationId xmlns:p14="http://schemas.microsoft.com/office/powerpoint/2010/main" val="1555245662"/>
+      </p:ext>
+    </p:extLst>
+  </p:cSld>
+  <p:clrMapOvr>
+    <a:masterClrMapping/>
+  </p:clrMapOvr>
+</p:sld>
+</file>
+
+<file path=ppt/slides/slide20.xml><?xml version="1.0" encoding="utf-8"?>
 <p:sld xmlns:a="http://schemas.openxmlformats.org/drawingml/2006/main" xmlns:r="http://schemas.openxmlformats.org/officeDocument/2006/relationships" xmlns:p="http://schemas.openxmlformats.org/presentationml/2006/main">
   <p:cSld>
     <p:spTree>
@@ -12116,142 +12479,7 @@
 </p:sld>
 </file>
 
-<file path=ppt/slides/slide2.xml><?xml version="1.0" encoding="utf-8"?>
-<p:sld xmlns:a="http://schemas.openxmlformats.org/drawingml/2006/main" xmlns:r="http://schemas.openxmlformats.org/officeDocument/2006/relationships" xmlns:p="http://schemas.openxmlformats.org/presentationml/2006/main">
-  <p:cSld>
-    <p:spTree>
-      <p:nvGrpSpPr>
-        <p:cNvPr id="1" name=""/>
-        <p:cNvGrpSpPr/>
-        <p:nvPr/>
-      </p:nvGrpSpPr>
-      <p:grpSpPr>
-        <a:xfrm>
-          <a:off x="0" y="0"/>
-          <a:ext cx="0" cy="0"/>
-          <a:chOff x="0" y="0"/>
-          <a:chExt cx="0" cy="0"/>
-        </a:xfrm>
-      </p:grpSpPr>
-      <p:sp>
-        <p:nvSpPr>
-          <p:cNvPr id="5" name="Content Placeholder 4">
-            <a:extLst>
-              <a:ext uri="{FF2B5EF4-FFF2-40B4-BE49-F238E27FC236}">
-                <a16:creationId xmlns:a16="http://schemas.microsoft.com/office/drawing/2014/main" id="{15B35FF2-444E-0C72-D2C7-F4B065A68CCB}"/>
-              </a:ext>
-            </a:extLst>
-          </p:cNvPr>
-          <p:cNvSpPr>
-            <a:spLocks noGrp="1"/>
-          </p:cNvSpPr>
-          <p:nvPr>
-            <p:ph idx="1"/>
-          </p:nvPr>
-        </p:nvSpPr>
-        <p:spPr/>
-        <p:txBody>
-          <a:bodyPr/>
-          <a:lstStyle/>
-          <a:p>
-            <a:r>
-              <a:rPr lang="en-US" dirty="0"/>
-              <a:t>HW1, HW3, and potentially some components of HW2 can be done in Rust, Java, or C++</a:t>
-            </a:r>
-          </a:p>
-          <a:p>
-            <a:pPr lvl="1"/>
-            <a:r>
-              <a:rPr lang="en-US" dirty="0"/>
-              <a:t>Part of HW2 will use Java Reflection and Annotations</a:t>
-            </a:r>
-          </a:p>
-          <a:p>
-            <a:pPr lvl="1"/>
-            <a:r>
-              <a:rPr lang="en-US" dirty="0"/>
-              <a:t>Caveats</a:t>
-            </a:r>
-          </a:p>
-          <a:p>
-            <a:pPr lvl="2"/>
-            <a:r>
-              <a:rPr lang="en-US" dirty="0"/>
-              <a:t>Only Java handout</a:t>
-            </a:r>
-          </a:p>
-          <a:p>
-            <a:pPr lvl="2"/>
-            <a:r>
-              <a:rPr lang="en-US" dirty="0"/>
-              <a:t>Fewer resources if using Rust/C++</a:t>
-            </a:r>
-          </a:p>
-          <a:p>
-            <a:pPr lvl="2"/>
-            <a:r>
-              <a:rPr lang="en-US" dirty="0"/>
-              <a:t>Using more than 95% safe Rust will have a 5% of the HW grade as extra-credit</a:t>
-            </a:r>
-          </a:p>
-          <a:p>
-            <a:r>
-              <a:rPr lang="en-US" dirty="0"/>
-              <a:t>Potentially other EC </a:t>
-            </a:r>
-            <a:r>
-              <a:rPr lang="en-US" dirty="0" err="1"/>
-              <a:t>homeworks</a:t>
-            </a:r>
-            <a:r>
-              <a:rPr lang="en-US" dirty="0"/>
-              <a:t> on Rust</a:t>
-            </a:r>
-          </a:p>
-        </p:txBody>
-      </p:sp>
-      <p:sp>
-        <p:nvSpPr>
-          <p:cNvPr id="4" name="Title 3">
-            <a:extLst>
-              <a:ext uri="{FF2B5EF4-FFF2-40B4-BE49-F238E27FC236}">
-                <a16:creationId xmlns:a16="http://schemas.microsoft.com/office/drawing/2014/main" id="{E19C93AA-7F3B-D081-D2DA-31D9CFFD1879}"/>
-              </a:ext>
-            </a:extLst>
-          </p:cNvPr>
-          <p:cNvSpPr>
-            <a:spLocks noGrp="1"/>
-          </p:cNvSpPr>
-          <p:nvPr>
-            <p:ph type="title"/>
-          </p:nvPr>
-        </p:nvSpPr>
-        <p:spPr/>
-        <p:txBody>
-          <a:bodyPr/>
-          <a:lstStyle/>
-          <a:p>
-            <a:r>
-              <a:rPr lang="en-US" dirty="0"/>
-              <a:t>Announcements</a:t>
-            </a:r>
-          </a:p>
-        </p:txBody>
-      </p:sp>
-    </p:spTree>
-    <p:extLst>
-      <p:ext uri="{BB962C8B-B14F-4D97-AF65-F5344CB8AC3E}">
-        <p14:creationId xmlns:p14="http://schemas.microsoft.com/office/powerpoint/2010/main" val="1555245662"/>
-      </p:ext>
-    </p:extLst>
-  </p:cSld>
-  <p:clrMapOvr>
-    <a:masterClrMapping/>
-  </p:clrMapOvr>
-</p:sld>
-</file>
-
-<file path=ppt/slides/slide20.xml><?xml version="1.0" encoding="utf-8"?>
+<file path=ppt/slides/slide21.xml><?xml version="1.0" encoding="utf-8"?>
 <p:sld xmlns:a="http://schemas.openxmlformats.org/drawingml/2006/main" xmlns:r="http://schemas.openxmlformats.org/officeDocument/2006/relationships" xmlns:p="http://schemas.openxmlformats.org/presentationml/2006/main">
   <p:cSld>
     <p:spTree>
@@ -12945,7 +13173,7 @@
 </p:sld>
 </file>
 
-<file path=ppt/slides/slide21.xml><?xml version="1.0" encoding="utf-8"?>
+<file path=ppt/slides/slide22.xml><?xml version="1.0" encoding="utf-8"?>
 <p:sld xmlns:a="http://schemas.openxmlformats.org/drawingml/2006/main" xmlns:r="http://schemas.openxmlformats.org/officeDocument/2006/relationships" xmlns:p="http://schemas.openxmlformats.org/presentationml/2006/main">
   <p:cSld>
     <p:spTree>
@@ -13833,7 +14061,7 @@
 </p:sld>
 </file>
 
-<file path=ppt/slides/slide22.xml><?xml version="1.0" encoding="utf-8"?>
+<file path=ppt/slides/slide23.xml><?xml version="1.0" encoding="utf-8"?>
 <p:sld xmlns:a="http://schemas.openxmlformats.org/drawingml/2006/main" xmlns:r="http://schemas.openxmlformats.org/officeDocument/2006/relationships" xmlns:p="http://schemas.openxmlformats.org/presentationml/2006/main">
   <p:cSld>
     <p:spTree>
@@ -14485,7 +14713,7 @@
 </p:sld>
 </file>
 
-<file path=ppt/slides/slide23.xml><?xml version="1.0" encoding="utf-8"?>
+<file path=ppt/slides/slide24.xml><?xml version="1.0" encoding="utf-8"?>
 <p:sld xmlns:a="http://schemas.openxmlformats.org/drawingml/2006/main" xmlns:r="http://schemas.openxmlformats.org/officeDocument/2006/relationships" xmlns:p="http://schemas.openxmlformats.org/presentationml/2006/main">
   <p:cSld>
     <p:spTree>
@@ -15876,7 +16104,7 @@
 </p:sld>
 </file>
 
-<file path=ppt/slides/slide24.xml><?xml version="1.0" encoding="utf-8"?>
+<file path=ppt/slides/slide25.xml><?xml version="1.0" encoding="utf-8"?>
 <p:sld xmlns:a="http://schemas.openxmlformats.org/drawingml/2006/main" xmlns:r="http://schemas.openxmlformats.org/officeDocument/2006/relationships" xmlns:p="http://schemas.openxmlformats.org/presentationml/2006/main">
   <p:cSld>
     <p:spTree>
@@ -16522,7 +16750,7 @@
 </p:sld>
 </file>
 
-<file path=ppt/slides/slide25.xml><?xml version="1.0" encoding="utf-8"?>
+<file path=ppt/slides/slide26.xml><?xml version="1.0" encoding="utf-8"?>
 <p:sld xmlns:a="http://schemas.openxmlformats.org/drawingml/2006/main" xmlns:r="http://schemas.openxmlformats.org/officeDocument/2006/relationships" xmlns:p="http://schemas.openxmlformats.org/presentationml/2006/main">
   <p:cSld>
     <p:spTree>
@@ -17158,7 +17386,7 @@
 </p:sld>
 </file>
 
-<file path=ppt/slides/slide26.xml><?xml version="1.0" encoding="utf-8"?>
+<file path=ppt/slides/slide27.xml><?xml version="1.0" encoding="utf-8"?>
 <p:sld xmlns:a="http://schemas.openxmlformats.org/drawingml/2006/main" xmlns:r="http://schemas.openxmlformats.org/officeDocument/2006/relationships" xmlns:p="http://schemas.openxmlformats.org/presentationml/2006/main">
   <p:cSld>
     <p:spTree>
@@ -18041,7 +18269,7 @@
 </p:sld>
 </file>
 
-<file path=ppt/slides/slide27.xml><?xml version="1.0" encoding="utf-8"?>
+<file path=ppt/slides/slide28.xml><?xml version="1.0" encoding="utf-8"?>
 <p:sld xmlns:a="http://schemas.openxmlformats.org/drawingml/2006/main" xmlns:r="http://schemas.openxmlformats.org/officeDocument/2006/relationships" xmlns:p="http://schemas.openxmlformats.org/presentationml/2006/main">
   <p:cSld>
     <p:spTree>
@@ -18554,7 +18782,7 @@
 </p:sld>
 </file>
 
-<file path=ppt/slides/slide28.xml><?xml version="1.0" encoding="utf-8"?>
+<file path=ppt/slides/slide29.xml><?xml version="1.0" encoding="utf-8"?>
 <p:sld xmlns:a="http://schemas.openxmlformats.org/drawingml/2006/main" xmlns:r="http://schemas.openxmlformats.org/officeDocument/2006/relationships" xmlns:p="http://schemas.openxmlformats.org/presentationml/2006/main">
   <p:cSld>
     <p:spTree>
@@ -18926,118 +19154,6 @@
     <p:extLst>
       <p:ext uri="{BB962C8B-B14F-4D97-AF65-F5344CB8AC3E}">
         <p14:creationId xmlns:p14="http://schemas.microsoft.com/office/powerpoint/2010/main" val="614988442"/>
-      </p:ext>
-    </p:extLst>
-  </p:cSld>
-  <p:clrMapOvr>
-    <a:masterClrMapping/>
-  </p:clrMapOvr>
-</p:sld>
-</file>
-
-<file path=ppt/slides/slide29.xml><?xml version="1.0" encoding="utf-8"?>
-<p:sld xmlns:a="http://schemas.openxmlformats.org/drawingml/2006/main" xmlns:r="http://schemas.openxmlformats.org/officeDocument/2006/relationships" xmlns:p="http://schemas.openxmlformats.org/presentationml/2006/main">
-  <p:cSld>
-    <p:spTree>
-      <p:nvGrpSpPr>
-        <p:cNvPr id="1" name=""/>
-        <p:cNvGrpSpPr/>
-        <p:nvPr/>
-      </p:nvGrpSpPr>
-      <p:grpSpPr>
-        <a:xfrm>
-          <a:off x="0" y="0"/>
-          <a:ext cx="0" cy="0"/>
-          <a:chOff x="0" y="0"/>
-          <a:chExt cx="0" cy="0"/>
-        </a:xfrm>
-      </p:grpSpPr>
-      <p:sp>
-        <p:nvSpPr>
-          <p:cNvPr id="6" name="Content Placeholder 5">
-            <a:extLst>
-              <a:ext uri="{FF2B5EF4-FFF2-40B4-BE49-F238E27FC236}">
-                <a16:creationId xmlns:a16="http://schemas.microsoft.com/office/drawing/2014/main" id="{00D61577-3A11-9337-C65D-B700080DBDA4}"/>
-              </a:ext>
-            </a:extLst>
-          </p:cNvPr>
-          <p:cNvSpPr>
-            <a:spLocks noGrp="1"/>
-          </p:cNvSpPr>
-          <p:nvPr>
-            <p:ph idx="1"/>
-          </p:nvPr>
-        </p:nvSpPr>
-        <p:spPr/>
-        <p:txBody>
-          <a:bodyPr/>
-          <a:lstStyle/>
-          <a:p>
-            <a:r>
-              <a:rPr lang="en-US" dirty="0"/>
-              <a:t>Rust doesn’t support inheritance, as such</a:t>
-            </a:r>
-          </a:p>
-          <a:p>
-            <a:r>
-              <a:rPr lang="en-US" dirty="0"/>
-              <a:t>Rust only supports Traits, which is similar to Interfaces in Java</a:t>
-            </a:r>
-          </a:p>
-          <a:p>
-            <a:r>
-              <a:rPr lang="en-US" dirty="0"/>
-              <a:t>C++ supports multiple inheritance</a:t>
-            </a:r>
-          </a:p>
-          <a:p>
-            <a:r>
-              <a:rPr lang="en-US" dirty="0"/>
-              <a:t>C++ supports runtime polymorphism only for </a:t>
-            </a:r>
-            <a:r>
-              <a:rPr lang="en-US" b="1" dirty="0"/>
-              <a:t>virtual</a:t>
-            </a:r>
-            <a:r>
-              <a:rPr lang="en-US" dirty="0"/>
-              <a:t> functions</a:t>
-            </a:r>
-          </a:p>
-        </p:txBody>
-      </p:sp>
-      <p:sp>
-        <p:nvSpPr>
-          <p:cNvPr id="5" name="Title 4">
-            <a:extLst>
-              <a:ext uri="{FF2B5EF4-FFF2-40B4-BE49-F238E27FC236}">
-                <a16:creationId xmlns:a16="http://schemas.microsoft.com/office/drawing/2014/main" id="{522764E0-0921-F4CE-20DE-05A869A35C86}"/>
-              </a:ext>
-            </a:extLst>
-          </p:cNvPr>
-          <p:cNvSpPr>
-            <a:spLocks noGrp="1"/>
-          </p:cNvSpPr>
-          <p:nvPr>
-            <p:ph type="title"/>
-          </p:nvPr>
-        </p:nvSpPr>
-        <p:spPr/>
-        <p:txBody>
-          <a:bodyPr/>
-          <a:lstStyle/>
-          <a:p>
-            <a:r>
-              <a:rPr lang="en-US" dirty="0"/>
-              <a:t>Other programming languages</a:t>
-            </a:r>
-          </a:p>
-        </p:txBody>
-      </p:sp>
-    </p:spTree>
-    <p:extLst>
-      <p:ext uri="{BB962C8B-B14F-4D97-AF65-F5344CB8AC3E}">
-        <p14:creationId xmlns:p14="http://schemas.microsoft.com/office/powerpoint/2010/main" val="3133263104"/>
       </p:ext>
     </p:extLst>
   </p:cSld>
@@ -19205,10 +19321,10 @@
       </p:grpSpPr>
       <p:sp>
         <p:nvSpPr>
-          <p:cNvPr id="2" name="Content Placeholder 1">
-            <a:extLst>
-              <a:ext uri="{FF2B5EF4-FFF2-40B4-BE49-F238E27FC236}">
-                <a16:creationId xmlns:a16="http://schemas.microsoft.com/office/drawing/2014/main" id="{6E49DA0F-0AAA-CE6F-37D1-8567EF092C91}"/>
+          <p:cNvPr id="6" name="Content Placeholder 5">
+            <a:extLst>
+              <a:ext uri="{FF2B5EF4-FFF2-40B4-BE49-F238E27FC236}">
+                <a16:creationId xmlns:a16="http://schemas.microsoft.com/office/drawing/2014/main" id="{00D61577-3A11-9337-C65D-B700080DBDA4}"/>
               </a:ext>
             </a:extLst>
           </p:cNvPr>
@@ -19224,16 +19340,45 @@
           <a:bodyPr/>
           <a:lstStyle/>
           <a:p>
-            <a:endParaRPr lang="en-US"/>
+            <a:r>
+              <a:rPr lang="en-US" dirty="0"/>
+              <a:t>Rust doesn’t support inheritance, as such</a:t>
+            </a:r>
+          </a:p>
+          <a:p>
+            <a:r>
+              <a:rPr lang="en-US" dirty="0"/>
+              <a:t>Rust only supports Traits, which is similar to Interfaces in Java</a:t>
+            </a:r>
+          </a:p>
+          <a:p>
+            <a:r>
+              <a:rPr lang="en-US" dirty="0"/>
+              <a:t>C++ supports multiple inheritance</a:t>
+            </a:r>
+          </a:p>
+          <a:p>
+            <a:r>
+              <a:rPr lang="en-US" dirty="0"/>
+              <a:t>C++ supports runtime polymorphism only for </a:t>
+            </a:r>
+            <a:r>
+              <a:rPr lang="en-US" b="1" dirty="0"/>
+              <a:t>virtual</a:t>
+            </a:r>
+            <a:r>
+              <a:rPr lang="en-US" dirty="0"/>
+              <a:t> functions</a:t>
+            </a:r>
           </a:p>
         </p:txBody>
       </p:sp>
       <p:sp>
         <p:nvSpPr>
-          <p:cNvPr id="3" name="Text Placeholder 2">
-            <a:extLst>
-              <a:ext uri="{FF2B5EF4-FFF2-40B4-BE49-F238E27FC236}">
-                <a16:creationId xmlns:a16="http://schemas.microsoft.com/office/drawing/2014/main" id="{162E3F82-F071-1AFC-87DD-F1A6F21DF1CA}"/>
+          <p:cNvPr id="5" name="Title 4">
+            <a:extLst>
+              <a:ext uri="{FF2B5EF4-FFF2-40B4-BE49-F238E27FC236}">
+                <a16:creationId xmlns:a16="http://schemas.microsoft.com/office/drawing/2014/main" id="{522764E0-0921-F4CE-20DE-05A869A35C86}"/>
               </a:ext>
             </a:extLst>
           </p:cNvPr>
@@ -19241,7 +19386,7 @@
             <a:spLocks noGrp="1"/>
           </p:cNvSpPr>
           <p:nvPr>
-            <p:ph type="body" sz="quarter" idx="13"/>
+            <p:ph type="title"/>
           </p:nvPr>
         </p:nvSpPr>
         <p:spPr/>
@@ -19251,7 +19396,7 @@
           <a:p>
             <a:r>
               <a:rPr lang="en-US" dirty="0"/>
-              <a:t>Software design principles (SOLID)</a:t>
+              <a:t>Other programming languages</a:t>
             </a:r>
           </a:p>
         </p:txBody>
@@ -19259,7 +19404,7 @@
     </p:spTree>
     <p:extLst>
       <p:ext uri="{BB962C8B-B14F-4D97-AF65-F5344CB8AC3E}">
-        <p14:creationId xmlns:p14="http://schemas.microsoft.com/office/powerpoint/2010/main" val="673872092"/>
+        <p14:creationId xmlns:p14="http://schemas.microsoft.com/office/powerpoint/2010/main" val="3133263104"/>
       </p:ext>
     </p:extLst>
   </p:cSld>
@@ -19288,10 +19433,10 @@
       </p:grpSpPr>
       <p:sp>
         <p:nvSpPr>
-          <p:cNvPr id="5" name="Content Placeholder 4">
-            <a:extLst>
-              <a:ext uri="{FF2B5EF4-FFF2-40B4-BE49-F238E27FC236}">
-                <a16:creationId xmlns:a16="http://schemas.microsoft.com/office/drawing/2014/main" id="{3E6937B2-2185-7CEE-D376-FFDB29AA8013}"/>
+          <p:cNvPr id="2" name="Content Placeholder 1">
+            <a:extLst>
+              <a:ext uri="{FF2B5EF4-FFF2-40B4-BE49-F238E27FC236}">
+                <a16:creationId xmlns:a16="http://schemas.microsoft.com/office/drawing/2014/main" id="{6E49DA0F-0AAA-CE6F-37D1-8567EF092C91}"/>
               </a:ext>
             </a:extLst>
           </p:cNvPr>
@@ -19307,34 +19452,16 @@
           <a:bodyPr/>
           <a:lstStyle/>
           <a:p>
-            <a:r>
-              <a:rPr lang="en-US" dirty="0"/>
-              <a:t>A class should have only one reason to change</a:t>
-            </a:r>
-          </a:p>
-          <a:p>
-            <a:r>
-              <a:rPr lang="en-US" dirty="0"/>
-              <a:t>Each class handles a single responsibility</a:t>
-            </a:r>
-          </a:p>
-          <a:p>
-            <a:r>
-              <a:rPr lang="en-US" dirty="0"/>
-              <a:t>Leads to clearer, testable code</a:t>
-            </a:r>
-          </a:p>
-          <a:p>
-            <a:endParaRPr lang="en-US" dirty="0"/>
+            <a:endParaRPr lang="en-US"/>
           </a:p>
         </p:txBody>
       </p:sp>
       <p:sp>
         <p:nvSpPr>
-          <p:cNvPr id="4" name="Title 3">
-            <a:extLst>
-              <a:ext uri="{FF2B5EF4-FFF2-40B4-BE49-F238E27FC236}">
-                <a16:creationId xmlns:a16="http://schemas.microsoft.com/office/drawing/2014/main" id="{34477B9E-F85C-F1E6-F790-D8ABCC1007CC}"/>
+          <p:cNvPr id="3" name="Text Placeholder 2">
+            <a:extLst>
+              <a:ext uri="{FF2B5EF4-FFF2-40B4-BE49-F238E27FC236}">
+                <a16:creationId xmlns:a16="http://schemas.microsoft.com/office/drawing/2014/main" id="{162E3F82-F071-1AFC-87DD-F1A6F21DF1CA}"/>
               </a:ext>
             </a:extLst>
           </p:cNvPr>
@@ -19342,7 +19469,7 @@
             <a:spLocks noGrp="1"/>
           </p:cNvSpPr>
           <p:nvPr>
-            <p:ph type="title"/>
+            <p:ph type="body" sz="quarter" idx="13"/>
           </p:nvPr>
         </p:nvSpPr>
         <p:spPr/>
@@ -19352,7 +19479,7 @@
           <a:p>
             <a:r>
               <a:rPr lang="en-US" dirty="0"/>
-              <a:t>Single Responsibility Principle (SRP)</a:t>
+              <a:t>Software design principles (SOLID)</a:t>
             </a:r>
           </a:p>
         </p:txBody>
@@ -19360,7 +19487,7 @@
     </p:spTree>
     <p:extLst>
       <p:ext uri="{BB962C8B-B14F-4D97-AF65-F5344CB8AC3E}">
-        <p14:creationId xmlns:p14="http://schemas.microsoft.com/office/powerpoint/2010/main" val="2359588506"/>
+        <p14:creationId xmlns:p14="http://schemas.microsoft.com/office/powerpoint/2010/main" val="673872092"/>
       </p:ext>
     </p:extLst>
   </p:cSld>
@@ -19392,7 +19519,7 @@
           <p:cNvPr id="5" name="Content Placeholder 4">
             <a:extLst>
               <a:ext uri="{FF2B5EF4-FFF2-40B4-BE49-F238E27FC236}">
-                <a16:creationId xmlns:a16="http://schemas.microsoft.com/office/drawing/2014/main" id="{661F08C2-0A43-749D-0D63-50FA76AF8029}"/>
+                <a16:creationId xmlns:a16="http://schemas.microsoft.com/office/drawing/2014/main" id="{3E6937B2-2185-7CEE-D376-FFDB29AA8013}"/>
               </a:ext>
             </a:extLst>
           </p:cNvPr>
@@ -19410,26 +19537,23 @@
           <a:p>
             <a:r>
               <a:rPr lang="en-US" dirty="0"/>
-              <a:t>Open for extension, closed for modification</a:t>
-            </a:r>
-          </a:p>
-          <a:p>
-            <a:r>
-              <a:rPr lang="en-US" dirty="0"/>
-              <a:t>Add new behavior via inheritance or composition</a:t>
-            </a:r>
-          </a:p>
-          <a:p>
-            <a:r>
-              <a:rPr lang="en-US" dirty="0"/>
-              <a:t>Avoids breaking existing code</a:t>
-            </a:r>
-          </a:p>
-          <a:p>
-            <a:r>
-              <a:rPr lang="en-US" dirty="0"/>
-              <a:t>E.g., make internal logic fields and methods private</a:t>
-            </a:r>
+              <a:t>A class should have only one reason to change</a:t>
+            </a:r>
+          </a:p>
+          <a:p>
+            <a:r>
+              <a:rPr lang="en-US" dirty="0"/>
+              <a:t>Each class handles a single responsibility</a:t>
+            </a:r>
+          </a:p>
+          <a:p>
+            <a:r>
+              <a:rPr lang="en-US" dirty="0"/>
+              <a:t>Leads to clearer, testable code</a:t>
+            </a:r>
+          </a:p>
+          <a:p>
+            <a:endParaRPr lang="en-US" dirty="0"/>
           </a:p>
         </p:txBody>
       </p:sp>
@@ -19438,7 +19562,7 @@
           <p:cNvPr id="4" name="Title 3">
             <a:extLst>
               <a:ext uri="{FF2B5EF4-FFF2-40B4-BE49-F238E27FC236}">
-                <a16:creationId xmlns:a16="http://schemas.microsoft.com/office/drawing/2014/main" id="{9AD302CE-7C55-A93C-1858-9B91603BAF60}"/>
+                <a16:creationId xmlns:a16="http://schemas.microsoft.com/office/drawing/2014/main" id="{34477B9E-F85C-F1E6-F790-D8ABCC1007CC}"/>
               </a:ext>
             </a:extLst>
           </p:cNvPr>
@@ -19456,7 +19580,7 @@
           <a:p>
             <a:r>
               <a:rPr lang="en-US" dirty="0"/>
-              <a:t>Open/Closed Principle (OCP)</a:t>
+              <a:t>Single Responsibility Principle (SRP)</a:t>
             </a:r>
           </a:p>
         </p:txBody>
@@ -19464,7 +19588,7 @@
     </p:spTree>
     <p:extLst>
       <p:ext uri="{BB962C8B-B14F-4D97-AF65-F5344CB8AC3E}">
-        <p14:creationId xmlns:p14="http://schemas.microsoft.com/office/powerpoint/2010/main" val="59484488"/>
+        <p14:creationId xmlns:p14="http://schemas.microsoft.com/office/powerpoint/2010/main" val="2359588506"/>
       </p:ext>
     </p:extLst>
   </p:cSld>
@@ -19496,7 +19620,7 @@
           <p:cNvPr id="5" name="Content Placeholder 4">
             <a:extLst>
               <a:ext uri="{FF2B5EF4-FFF2-40B4-BE49-F238E27FC236}">
-                <a16:creationId xmlns:a16="http://schemas.microsoft.com/office/drawing/2014/main" id="{FC76F009-33DA-5F15-727F-D02B4C2C4314}"/>
+                <a16:creationId xmlns:a16="http://schemas.microsoft.com/office/drawing/2014/main" id="{661F08C2-0A43-749D-0D63-50FA76AF8029}"/>
               </a:ext>
             </a:extLst>
           </p:cNvPr>
@@ -19514,19 +19638,25 @@
           <a:p>
             <a:r>
               <a:rPr lang="en-US" dirty="0"/>
-              <a:t>Subtypes must be substitutable for base types</a:t>
-            </a:r>
-          </a:p>
-          <a:p>
-            <a:r>
-              <a:rPr lang="en-US" dirty="0"/>
-              <a:t>Derived classes shouldn’t break expected behavior</a:t>
-            </a:r>
-          </a:p>
-          <a:p>
-            <a:r>
-              <a:rPr lang="en-US" dirty="0"/>
-              <a:t>Ensures polymorphism works correctly</a:t>
+              <a:t>Open for extension, closed for modification</a:t>
+            </a:r>
+          </a:p>
+          <a:p>
+            <a:r>
+              <a:rPr lang="en-US" dirty="0"/>
+              <a:t>Add new behavior via inheritance or composition</a:t>
+            </a:r>
+          </a:p>
+          <a:p>
+            <a:r>
+              <a:rPr lang="en-US" dirty="0"/>
+              <a:t>Avoids breaking existing code</a:t>
+            </a:r>
+          </a:p>
+          <a:p>
+            <a:r>
+              <a:rPr lang="en-US" dirty="0"/>
+              <a:t>E.g., make internal logic fields and methods private</a:t>
             </a:r>
           </a:p>
         </p:txBody>
@@ -19536,7 +19666,7 @@
           <p:cNvPr id="4" name="Title 3">
             <a:extLst>
               <a:ext uri="{FF2B5EF4-FFF2-40B4-BE49-F238E27FC236}">
-                <a16:creationId xmlns:a16="http://schemas.microsoft.com/office/drawing/2014/main" id="{83B1BA5B-8FCE-7E61-804C-809712D156A5}"/>
+                <a16:creationId xmlns:a16="http://schemas.microsoft.com/office/drawing/2014/main" id="{9AD302CE-7C55-A93C-1858-9B91603BAF60}"/>
               </a:ext>
             </a:extLst>
           </p:cNvPr>
@@ -19553,12 +19683,8 @@
           <a:lstStyle/>
           <a:p>
             <a:r>
-              <a:rPr lang="en-US" dirty="0" err="1"/>
-              <a:t>Liskov</a:t>
-            </a:r>
-            <a:r>
-              <a:rPr lang="en-US" dirty="0"/>
-              <a:t> Substitution Principle (LSP)</a:t>
+              <a:rPr lang="en-US" dirty="0"/>
+              <a:t>Open/Closed Principle (OCP)</a:t>
             </a:r>
           </a:p>
         </p:txBody>
@@ -19566,7 +19692,7 @@
     </p:spTree>
     <p:extLst>
       <p:ext uri="{BB962C8B-B14F-4D97-AF65-F5344CB8AC3E}">
-        <p14:creationId xmlns:p14="http://schemas.microsoft.com/office/powerpoint/2010/main" val="3369244572"/>
+        <p14:creationId xmlns:p14="http://schemas.microsoft.com/office/powerpoint/2010/main" val="59484488"/>
       </p:ext>
     </p:extLst>
   </p:cSld>
@@ -19598,7 +19724,7 @@
           <p:cNvPr id="5" name="Content Placeholder 4">
             <a:extLst>
               <a:ext uri="{FF2B5EF4-FFF2-40B4-BE49-F238E27FC236}">
-                <a16:creationId xmlns:a16="http://schemas.microsoft.com/office/drawing/2014/main" id="{400834FC-E0B1-774E-081B-87ECFD07A47D}"/>
+                <a16:creationId xmlns:a16="http://schemas.microsoft.com/office/drawing/2014/main" id="{FC76F009-33DA-5F15-727F-D02B4C2C4314}"/>
               </a:ext>
             </a:extLst>
           </p:cNvPr>
@@ -19616,19 +19742,19 @@
           <a:p>
             <a:r>
               <a:rPr lang="en-US" dirty="0"/>
-              <a:t>Prefer many small interfaces over one large one</a:t>
-            </a:r>
-          </a:p>
-          <a:p>
-            <a:r>
-              <a:rPr lang="en-US" dirty="0"/>
-              <a:t>Clients only depend on methods they use</a:t>
-            </a:r>
-          </a:p>
-          <a:p>
-            <a:r>
-              <a:rPr lang="en-US" dirty="0"/>
-              <a:t>Avoids “fat” interfaces and reduces side effects</a:t>
+              <a:t>Subtypes must be substitutable for base types</a:t>
+            </a:r>
+          </a:p>
+          <a:p>
+            <a:r>
+              <a:rPr lang="en-US" dirty="0"/>
+              <a:t>Derived classes shouldn’t break expected behavior</a:t>
+            </a:r>
+          </a:p>
+          <a:p>
+            <a:r>
+              <a:rPr lang="en-US" dirty="0"/>
+              <a:t>Ensures polymorphism works correctly</a:t>
             </a:r>
           </a:p>
         </p:txBody>
@@ -19638,7 +19764,7 @@
           <p:cNvPr id="4" name="Title 3">
             <a:extLst>
               <a:ext uri="{FF2B5EF4-FFF2-40B4-BE49-F238E27FC236}">
-                <a16:creationId xmlns:a16="http://schemas.microsoft.com/office/drawing/2014/main" id="{BB7443A4-2331-560F-ED5B-3079204EDCDA}"/>
+                <a16:creationId xmlns:a16="http://schemas.microsoft.com/office/drawing/2014/main" id="{83B1BA5B-8FCE-7E61-804C-809712D156A5}"/>
               </a:ext>
             </a:extLst>
           </p:cNvPr>
@@ -19655,8 +19781,12 @@
           <a:lstStyle/>
           <a:p>
             <a:r>
-              <a:rPr lang="en-US" dirty="0"/>
-              <a:t>Interface Segregation Principle (ISP)</a:t>
+              <a:rPr lang="en-US" dirty="0" err="1"/>
+              <a:t>Liskov</a:t>
+            </a:r>
+            <a:r>
+              <a:rPr lang="en-US" dirty="0"/>
+              <a:t> Substitution Principle (LSP)</a:t>
             </a:r>
           </a:p>
         </p:txBody>
@@ -19664,7 +19794,7 @@
     </p:spTree>
     <p:extLst>
       <p:ext uri="{BB962C8B-B14F-4D97-AF65-F5344CB8AC3E}">
-        <p14:creationId xmlns:p14="http://schemas.microsoft.com/office/powerpoint/2010/main" val="3917255874"/>
+        <p14:creationId xmlns:p14="http://schemas.microsoft.com/office/powerpoint/2010/main" val="3369244572"/>
       </p:ext>
     </p:extLst>
   </p:cSld>
@@ -19696,7 +19826,7 @@
           <p:cNvPr id="5" name="Content Placeholder 4">
             <a:extLst>
               <a:ext uri="{FF2B5EF4-FFF2-40B4-BE49-F238E27FC236}">
-                <a16:creationId xmlns:a16="http://schemas.microsoft.com/office/drawing/2014/main" id="{D47A1F0B-487E-AFB4-6CAD-C4641B68DB5F}"/>
+                <a16:creationId xmlns:a16="http://schemas.microsoft.com/office/drawing/2014/main" id="{400834FC-E0B1-774E-081B-87ECFD07A47D}"/>
               </a:ext>
             </a:extLst>
           </p:cNvPr>
@@ -19714,19 +19844,19 @@
           <a:p>
             <a:r>
               <a:rPr lang="en-US" dirty="0"/>
-              <a:t>Depend on abstractions, not concretions</a:t>
-            </a:r>
-          </a:p>
-          <a:p>
-            <a:r>
-              <a:rPr lang="en-US" dirty="0"/>
-              <a:t>High-level modules should not depend on low-level modules</a:t>
-            </a:r>
-          </a:p>
-          <a:p>
-            <a:r>
-              <a:rPr lang="en-US" dirty="0"/>
-              <a:t>Enables flexible, decoupled architectures</a:t>
+              <a:t>Prefer many small interfaces over one large one</a:t>
+            </a:r>
+          </a:p>
+          <a:p>
+            <a:r>
+              <a:rPr lang="en-US" dirty="0"/>
+              <a:t>Clients only depend on methods they use</a:t>
+            </a:r>
+          </a:p>
+          <a:p>
+            <a:r>
+              <a:rPr lang="en-US" dirty="0"/>
+              <a:t>Avoids “fat” interfaces and reduces side effects</a:t>
             </a:r>
           </a:p>
         </p:txBody>
@@ -19736,7 +19866,7 @@
           <p:cNvPr id="4" name="Title 3">
             <a:extLst>
               <a:ext uri="{FF2B5EF4-FFF2-40B4-BE49-F238E27FC236}">
-                <a16:creationId xmlns:a16="http://schemas.microsoft.com/office/drawing/2014/main" id="{DAC12E22-1D0A-5662-BB5C-D3348E4C863A}"/>
+                <a16:creationId xmlns:a16="http://schemas.microsoft.com/office/drawing/2014/main" id="{BB7443A4-2331-560F-ED5B-3079204EDCDA}"/>
               </a:ext>
             </a:extLst>
           </p:cNvPr>
@@ -19754,7 +19884,7 @@
           <a:p>
             <a:r>
               <a:rPr lang="en-US" dirty="0"/>
-              <a:t>Dependency Inversion Principle (DIP)</a:t>
+              <a:t>Interface Segregation Principle (ISP)</a:t>
             </a:r>
           </a:p>
         </p:txBody>
@@ -19762,7 +19892,7 @@
     </p:spTree>
     <p:extLst>
       <p:ext uri="{BB962C8B-B14F-4D97-AF65-F5344CB8AC3E}">
-        <p14:creationId xmlns:p14="http://schemas.microsoft.com/office/powerpoint/2010/main" val="4267302869"/>
+        <p14:creationId xmlns:p14="http://schemas.microsoft.com/office/powerpoint/2010/main" val="3917255874"/>
       </p:ext>
     </p:extLst>
   </p:cSld>
@@ -19791,6 +19921,104 @@
       </p:grpSpPr>
       <p:sp>
         <p:nvSpPr>
+          <p:cNvPr id="5" name="Content Placeholder 4">
+            <a:extLst>
+              <a:ext uri="{FF2B5EF4-FFF2-40B4-BE49-F238E27FC236}">
+                <a16:creationId xmlns:a16="http://schemas.microsoft.com/office/drawing/2014/main" id="{D47A1F0B-487E-AFB4-6CAD-C4641B68DB5F}"/>
+              </a:ext>
+            </a:extLst>
+          </p:cNvPr>
+          <p:cNvSpPr>
+            <a:spLocks noGrp="1"/>
+          </p:cNvSpPr>
+          <p:nvPr>
+            <p:ph idx="1"/>
+          </p:nvPr>
+        </p:nvSpPr>
+        <p:spPr/>
+        <p:txBody>
+          <a:bodyPr/>
+          <a:lstStyle/>
+          <a:p>
+            <a:r>
+              <a:rPr lang="en-US" dirty="0"/>
+              <a:t>Depend on abstractions, not concretions</a:t>
+            </a:r>
+          </a:p>
+          <a:p>
+            <a:r>
+              <a:rPr lang="en-US" dirty="0"/>
+              <a:t>High-level modules should not depend on low-level modules</a:t>
+            </a:r>
+          </a:p>
+          <a:p>
+            <a:r>
+              <a:rPr lang="en-US" dirty="0"/>
+              <a:t>Enables flexible, decoupled architectures</a:t>
+            </a:r>
+          </a:p>
+        </p:txBody>
+      </p:sp>
+      <p:sp>
+        <p:nvSpPr>
+          <p:cNvPr id="4" name="Title 3">
+            <a:extLst>
+              <a:ext uri="{FF2B5EF4-FFF2-40B4-BE49-F238E27FC236}">
+                <a16:creationId xmlns:a16="http://schemas.microsoft.com/office/drawing/2014/main" id="{DAC12E22-1D0A-5662-BB5C-D3348E4C863A}"/>
+              </a:ext>
+            </a:extLst>
+          </p:cNvPr>
+          <p:cNvSpPr>
+            <a:spLocks noGrp="1"/>
+          </p:cNvSpPr>
+          <p:nvPr>
+            <p:ph type="title"/>
+          </p:nvPr>
+        </p:nvSpPr>
+        <p:spPr/>
+        <p:txBody>
+          <a:bodyPr/>
+          <a:lstStyle/>
+          <a:p>
+            <a:r>
+              <a:rPr lang="en-US" dirty="0"/>
+              <a:t>Dependency Inversion Principle (DIP)</a:t>
+            </a:r>
+          </a:p>
+        </p:txBody>
+      </p:sp>
+    </p:spTree>
+    <p:extLst>
+      <p:ext uri="{BB962C8B-B14F-4D97-AF65-F5344CB8AC3E}">
+        <p14:creationId xmlns:p14="http://schemas.microsoft.com/office/powerpoint/2010/main" val="4267302869"/>
+      </p:ext>
+    </p:extLst>
+  </p:cSld>
+  <p:clrMapOvr>
+    <a:masterClrMapping/>
+  </p:clrMapOvr>
+</p:sld>
+</file>
+
+<file path=ppt/slides/slide37.xml><?xml version="1.0" encoding="utf-8"?>
+<p:sld xmlns:a="http://schemas.openxmlformats.org/drawingml/2006/main" xmlns:r="http://schemas.openxmlformats.org/officeDocument/2006/relationships" xmlns:p="http://schemas.openxmlformats.org/presentationml/2006/main">
+  <p:cSld>
+    <p:spTree>
+      <p:nvGrpSpPr>
+        <p:cNvPr id="1" name=""/>
+        <p:cNvGrpSpPr/>
+        <p:nvPr/>
+      </p:nvGrpSpPr>
+      <p:grpSpPr>
+        <a:xfrm>
+          <a:off x="0" y="0"/>
+          <a:ext cx="0" cy="0"/>
+          <a:chOff x="0" y="0"/>
+          <a:chExt cx="0" cy="0"/>
+        </a:xfrm>
+      </p:grpSpPr>
+      <p:sp>
+        <p:nvSpPr>
           <p:cNvPr id="2" name="Content Placeholder 1">
             <a:extLst>
               <a:ext uri="{FF2B5EF4-FFF2-40B4-BE49-F238E27FC236}">
@@ -19855,7 +20083,7 @@
 </p:sld>
 </file>
 
-<file path=ppt/slides/slide37.xml><?xml version="1.0" encoding="utf-8"?>
+<file path=ppt/slides/slide38.xml><?xml version="1.0" encoding="utf-8"?>
 <p:sld xmlns:a="http://schemas.openxmlformats.org/drawingml/2006/main" xmlns:r="http://schemas.openxmlformats.org/officeDocument/2006/relationships" xmlns:p="http://schemas.openxmlformats.org/presentationml/2006/main">
   <p:cSld>
     <p:spTree>
@@ -20570,7 +20798,7 @@
 </p:sld>
 </file>
 
-<file path=ppt/slides/slide38.xml><?xml version="1.0" encoding="utf-8"?>
+<file path=ppt/slides/slide39.xml><?xml version="1.0" encoding="utf-8"?>
 <p:sld xmlns:a="http://schemas.openxmlformats.org/drawingml/2006/main" xmlns:r="http://schemas.openxmlformats.org/officeDocument/2006/relationships" xmlns:p="http://schemas.openxmlformats.org/presentationml/2006/main">
   <p:cSld>
     <p:spTree>
@@ -21447,7 +21675,412 @@
 </p:sld>
 </file>
 
-<file path=ppt/slides/slide39.xml><?xml version="1.0" encoding="utf-8"?>
+<file path=ppt/slides/slide4.xml><?xml version="1.0" encoding="utf-8"?>
+<p:sld xmlns:a="http://schemas.openxmlformats.org/drawingml/2006/main" xmlns:r="http://schemas.openxmlformats.org/officeDocument/2006/relationships" xmlns:p="http://schemas.openxmlformats.org/presentationml/2006/main">
+  <p:cSld>
+    <p:spTree>
+      <p:nvGrpSpPr>
+        <p:cNvPr id="1" name=""/>
+        <p:cNvGrpSpPr/>
+        <p:nvPr/>
+      </p:nvGrpSpPr>
+      <p:grpSpPr>
+        <a:xfrm>
+          <a:off x="0" y="0"/>
+          <a:ext cx="0" cy="0"/>
+          <a:chOff x="0" y="0"/>
+          <a:chExt cx="0" cy="0"/>
+        </a:xfrm>
+      </p:grpSpPr>
+      <p:sp>
+        <p:nvSpPr>
+          <p:cNvPr id="2" name="Content Placeholder 1">
+            <a:extLst>
+              <a:ext uri="{FF2B5EF4-FFF2-40B4-BE49-F238E27FC236}">
+                <a16:creationId xmlns:a16="http://schemas.microsoft.com/office/drawing/2014/main" id="{8ACF9742-3350-1D65-AB1F-E445C30B36DE}"/>
+              </a:ext>
+            </a:extLst>
+          </p:cNvPr>
+          <p:cNvSpPr>
+            <a:spLocks noGrp="1"/>
+          </p:cNvSpPr>
+          <p:nvPr>
+            <p:ph idx="1"/>
+          </p:nvPr>
+        </p:nvSpPr>
+        <p:spPr>
+          <a:xfrm>
+            <a:off x="360607" y="785004"/>
+            <a:ext cx="11449319" cy="5046453"/>
+          </a:xfrm>
+        </p:spPr>
+        <p:txBody>
+          <a:bodyPr/>
+          <a:lstStyle/>
+          <a:p>
+            <a:r>
+              <a:rPr lang="en-US"/>
+              <a:t>Objects have properties and functions</a:t>
+            </a:r>
+            <a:endParaRPr lang="en-US" dirty="0"/>
+          </a:p>
+        </p:txBody>
+      </p:sp>
+      <p:sp>
+        <p:nvSpPr>
+          <p:cNvPr id="3" name="Title 2">
+            <a:extLst>
+              <a:ext uri="{FF2B5EF4-FFF2-40B4-BE49-F238E27FC236}">
+                <a16:creationId xmlns:a16="http://schemas.microsoft.com/office/drawing/2014/main" id="{6BE0EAE0-FAB3-33AA-DB3C-DDC2394A80CD}"/>
+              </a:ext>
+            </a:extLst>
+          </p:cNvPr>
+          <p:cNvSpPr>
+            <a:spLocks noGrp="1"/>
+          </p:cNvSpPr>
+          <p:nvPr>
+            <p:ph type="title"/>
+          </p:nvPr>
+        </p:nvSpPr>
+        <p:spPr>
+          <a:xfrm>
+            <a:off x="0" y="0"/>
+            <a:ext cx="12192000" cy="696277"/>
+          </a:xfrm>
+        </p:spPr>
+        <p:txBody>
+          <a:bodyPr/>
+          <a:lstStyle/>
+          <a:p>
+            <a:r>
+              <a:rPr lang="en-US"/>
+              <a:t>What is an object?</a:t>
+            </a:r>
+            <a:endParaRPr lang="en-US" dirty="0"/>
+          </a:p>
+        </p:txBody>
+      </p:sp>
+      <p:sp>
+        <p:nvSpPr>
+          <p:cNvPr id="7" name="Subtitle 6">
+            <a:extLst>
+              <a:ext uri="{FF2B5EF4-FFF2-40B4-BE49-F238E27FC236}">
+                <a16:creationId xmlns:a16="http://schemas.microsoft.com/office/drawing/2014/main" id="{CE9159A9-FF0A-B8E9-0C14-2B159D3C6BA6}"/>
+              </a:ext>
+            </a:extLst>
+          </p:cNvPr>
+          <p:cNvSpPr>
+            <a:spLocks noGrp="1"/>
+          </p:cNvSpPr>
+          <p:nvPr>
+            <p:ph type="subTitle" idx="13"/>
+          </p:nvPr>
+        </p:nvSpPr>
+        <p:spPr/>
+        <p:txBody>
+          <a:bodyPr/>
+          <a:lstStyle/>
+          <a:p>
+            <a:endParaRPr lang="en-US"/>
+          </a:p>
+        </p:txBody>
+      </p:sp>
+      <p:pic>
+        <p:nvPicPr>
+          <p:cNvPr id="1026" name="Picture 2" descr="Best Cars of 2024 and 2025 - Top-Rated New Cars Ranked | KBB.com">
+            <a:extLst>
+              <a:ext uri="{FF2B5EF4-FFF2-40B4-BE49-F238E27FC236}">
+                <a16:creationId xmlns:a16="http://schemas.microsoft.com/office/drawing/2014/main" id="{D0B3A394-D3F6-ACDF-9E4D-40D79040B9C8}"/>
+              </a:ext>
+            </a:extLst>
+          </p:cNvPr>
+          <p:cNvPicPr>
+            <a:picLocks noChangeAspect="1" noChangeArrowheads="1"/>
+          </p:cNvPicPr>
+          <p:nvPr/>
+        </p:nvPicPr>
+        <p:blipFill>
+          <a:blip r:embed="rId3" cstate="print">
+            <a:extLst>
+              <a:ext uri="{28A0092B-C50C-407E-A947-70E740481C1C}">
+                <a14:useLocalDpi xmlns:a14="http://schemas.microsoft.com/office/drawing/2010/main" val="0"/>
+              </a:ext>
+            </a:extLst>
+          </a:blip>
+          <a:srcRect/>
+          <a:stretch>
+            <a:fillRect/>
+          </a:stretch>
+        </p:blipFill>
+        <p:spPr bwMode="auto">
+          <a:xfrm>
+            <a:off x="529940" y="1598124"/>
+            <a:ext cx="3330859" cy="1347957"/>
+          </a:xfrm>
+          <a:prstGeom prst="rect">
+            <a:avLst/>
+          </a:prstGeom>
+          <a:noFill/>
+          <a:extLst>
+            <a:ext uri="{909E8E84-426E-40DD-AFC4-6F175D3DCCD1}">
+              <a14:hiddenFill xmlns:a14="http://schemas.microsoft.com/office/drawing/2010/main">
+                <a:solidFill>
+                  <a:srgbClr val="FFFFFF"/>
+                </a:solidFill>
+              </a14:hiddenFill>
+            </a:ext>
+          </a:extLst>
+        </p:spPr>
+      </p:pic>
+      <p:pic>
+        <p:nvPicPr>
+          <p:cNvPr id="1028" name="Picture 4" descr="Understanding Behavioral Changes in Senior Dogs | Dog Aging Project">
+            <a:extLst>
+              <a:ext uri="{FF2B5EF4-FFF2-40B4-BE49-F238E27FC236}">
+                <a16:creationId xmlns:a16="http://schemas.microsoft.com/office/drawing/2014/main" id="{5812A8B1-EF6D-9DC6-4052-4E8A1E1A83C7}"/>
+              </a:ext>
+            </a:extLst>
+          </p:cNvPr>
+          <p:cNvPicPr>
+            <a:picLocks noChangeAspect="1" noChangeArrowheads="1"/>
+          </p:cNvPicPr>
+          <p:nvPr/>
+        </p:nvPicPr>
+        <p:blipFill>
+          <a:blip r:embed="rId4" cstate="print">
+            <a:extLst>
+              <a:ext uri="{28A0092B-C50C-407E-A947-70E740481C1C}">
+                <a14:useLocalDpi xmlns:a14="http://schemas.microsoft.com/office/drawing/2010/main" val="0"/>
+              </a:ext>
+            </a:extLst>
+          </a:blip>
+          <a:srcRect/>
+          <a:stretch>
+            <a:fillRect/>
+          </a:stretch>
+        </p:blipFill>
+        <p:spPr bwMode="auto">
+          <a:xfrm>
+            <a:off x="827897" y="3831255"/>
+            <a:ext cx="2575454" cy="1717234"/>
+          </a:xfrm>
+          <a:prstGeom prst="rect">
+            <a:avLst/>
+          </a:prstGeom>
+          <a:noFill/>
+          <a:extLst>
+            <a:ext uri="{909E8E84-426E-40DD-AFC4-6F175D3DCCD1}">
+              <a14:hiddenFill xmlns:a14="http://schemas.microsoft.com/office/drawing/2010/main">
+                <a:solidFill>
+                  <a:srgbClr val="FFFFFF"/>
+                </a:solidFill>
+              </a14:hiddenFill>
+            </a:ext>
+          </a:extLst>
+        </p:spPr>
+      </p:pic>
+      <p:pic>
+        <p:nvPicPr>
+          <p:cNvPr id="1030" name="Picture 6" descr="Professional Woman Stock Photos, Images and Backgrounds for Free Download">
+            <a:extLst>
+              <a:ext uri="{FF2B5EF4-FFF2-40B4-BE49-F238E27FC236}">
+                <a16:creationId xmlns:a16="http://schemas.microsoft.com/office/drawing/2014/main" id="{C5D996F2-8637-3CFD-2B62-E4DDFD288786}"/>
+              </a:ext>
+            </a:extLst>
+          </p:cNvPr>
+          <p:cNvPicPr>
+            <a:picLocks noChangeAspect="1" noChangeArrowheads="1"/>
+          </p:cNvPicPr>
+          <p:nvPr/>
+        </p:nvPicPr>
+        <p:blipFill>
+          <a:blip r:embed="rId5" cstate="print">
+            <a:extLst>
+              <a:ext uri="{28A0092B-C50C-407E-A947-70E740481C1C}">
+                <a14:useLocalDpi xmlns:a14="http://schemas.microsoft.com/office/drawing/2010/main" val="0"/>
+              </a:ext>
+            </a:extLst>
+          </a:blip>
+          <a:srcRect/>
+          <a:stretch>
+            <a:fillRect/>
+          </a:stretch>
+        </p:blipFill>
+        <p:spPr bwMode="auto">
+          <a:xfrm>
+            <a:off x="4797539" y="1357433"/>
+            <a:ext cx="2575454" cy="1931255"/>
+          </a:xfrm>
+          <a:prstGeom prst="rect">
+            <a:avLst/>
+          </a:prstGeom>
+          <a:noFill/>
+          <a:extLst>
+            <a:ext uri="{909E8E84-426E-40DD-AFC4-6F175D3DCCD1}">
+              <a14:hiddenFill xmlns:a14="http://schemas.microsoft.com/office/drawing/2010/main">
+                <a:solidFill>
+                  <a:srgbClr val="FFFFFF"/>
+                </a:solidFill>
+              </a14:hiddenFill>
+            </a:ext>
+          </a:extLst>
+        </p:spPr>
+      </p:pic>
+      <p:pic>
+        <p:nvPicPr>
+          <p:cNvPr id="1032" name="Picture 8" descr="Roll: Bicycle Company A:1 Adventure Bike">
+            <a:extLst>
+              <a:ext uri="{FF2B5EF4-FFF2-40B4-BE49-F238E27FC236}">
+                <a16:creationId xmlns:a16="http://schemas.microsoft.com/office/drawing/2014/main" id="{A6DEBE71-9A16-E558-68CA-3DBB9959789B}"/>
+              </a:ext>
+            </a:extLst>
+          </p:cNvPr>
+          <p:cNvPicPr>
+            <a:picLocks noChangeAspect="1" noChangeArrowheads="1"/>
+          </p:cNvPicPr>
+          <p:nvPr/>
+        </p:nvPicPr>
+        <p:blipFill>
+          <a:blip r:embed="rId6" cstate="print">
+            <a:extLst>
+              <a:ext uri="{28A0092B-C50C-407E-A947-70E740481C1C}">
+                <a14:useLocalDpi xmlns:a14="http://schemas.microsoft.com/office/drawing/2010/main" val="0"/>
+              </a:ext>
+            </a:extLst>
+          </a:blip>
+          <a:srcRect/>
+          <a:stretch>
+            <a:fillRect/>
+          </a:stretch>
+        </p:blipFill>
+        <p:spPr bwMode="auto">
+          <a:xfrm>
+            <a:off x="8267644" y="3503877"/>
+            <a:ext cx="3527778" cy="2116667"/>
+          </a:xfrm>
+          <a:prstGeom prst="rect">
+            <a:avLst/>
+          </a:prstGeom>
+          <a:noFill/>
+          <a:extLst>
+            <a:ext uri="{909E8E84-426E-40DD-AFC4-6F175D3DCCD1}">
+              <a14:hiddenFill xmlns:a14="http://schemas.microsoft.com/office/drawing/2010/main">
+                <a:solidFill>
+                  <a:srgbClr val="FFFFFF"/>
+                </a:solidFill>
+              </a14:hiddenFill>
+            </a:ext>
+          </a:extLst>
+        </p:spPr>
+      </p:pic>
+      <p:pic>
+        <p:nvPicPr>
+          <p:cNvPr id="1034" name="Picture 10" descr="True Fine 16.5-in Brushed Steel LED Touch Table Lamp with Fabric Shade  20080T-BN at Lowes.com">
+            <a:extLst>
+              <a:ext uri="{FF2B5EF4-FFF2-40B4-BE49-F238E27FC236}">
+                <a16:creationId xmlns:a16="http://schemas.microsoft.com/office/drawing/2014/main" id="{B33B9FBE-636D-877F-1CA6-7513A4E829B6}"/>
+              </a:ext>
+            </a:extLst>
+          </p:cNvPr>
+          <p:cNvPicPr>
+            <a:picLocks noChangeAspect="1" noChangeArrowheads="1"/>
+          </p:cNvPicPr>
+          <p:nvPr/>
+        </p:nvPicPr>
+        <p:blipFill>
+          <a:blip r:embed="rId7" cstate="print">
+            <a:extLst>
+              <a:ext uri="{28A0092B-C50C-407E-A947-70E740481C1C}">
+                <a14:useLocalDpi xmlns:a14="http://schemas.microsoft.com/office/drawing/2010/main" val="0"/>
+              </a:ext>
+            </a:extLst>
+          </a:blip>
+          <a:srcRect/>
+          <a:stretch>
+            <a:fillRect/>
+          </a:stretch>
+        </p:blipFill>
+        <p:spPr bwMode="auto">
+          <a:xfrm>
+            <a:off x="9033822" y="1344072"/>
+            <a:ext cx="1995422" cy="1995422"/>
+          </a:xfrm>
+          <a:prstGeom prst="rect">
+            <a:avLst/>
+          </a:prstGeom>
+          <a:noFill/>
+          <a:extLst>
+            <a:ext uri="{909E8E84-426E-40DD-AFC4-6F175D3DCCD1}">
+              <a14:hiddenFill xmlns:a14="http://schemas.microsoft.com/office/drawing/2010/main">
+                <a:solidFill>
+                  <a:srgbClr val="FFFFFF"/>
+                </a:solidFill>
+              </a14:hiddenFill>
+            </a:ext>
+          </a:extLst>
+        </p:spPr>
+      </p:pic>
+      <p:pic>
+        <p:nvPicPr>
+          <p:cNvPr id="1036" name="Picture 12" descr="Twinkle Twinkle Little Firefly - Humane Gardener">
+            <a:extLst>
+              <a:ext uri="{FF2B5EF4-FFF2-40B4-BE49-F238E27FC236}">
+                <a16:creationId xmlns:a16="http://schemas.microsoft.com/office/drawing/2014/main" id="{DA3A625C-BA86-22D3-9AF0-985AA2A6F3A0}"/>
+              </a:ext>
+            </a:extLst>
+          </p:cNvPr>
+          <p:cNvPicPr>
+            <a:picLocks noChangeAspect="1" noChangeArrowheads="1"/>
+          </p:cNvPicPr>
+          <p:nvPr/>
+        </p:nvPicPr>
+        <p:blipFill>
+          <a:blip r:embed="rId8" cstate="print">
+            <a:extLst>
+              <a:ext uri="{28A0092B-C50C-407E-A947-70E740481C1C}">
+                <a14:useLocalDpi xmlns:a14="http://schemas.microsoft.com/office/drawing/2010/main" val="0"/>
+              </a:ext>
+            </a:extLst>
+          </a:blip>
+          <a:srcRect/>
+          <a:stretch>
+            <a:fillRect/>
+          </a:stretch>
+        </p:blipFill>
+        <p:spPr bwMode="auto">
+          <a:xfrm>
+            <a:off x="4606579" y="3677531"/>
+            <a:ext cx="3330859" cy="1873175"/>
+          </a:xfrm>
+          <a:prstGeom prst="rect">
+            <a:avLst/>
+          </a:prstGeom>
+          <a:noFill/>
+          <a:extLst>
+            <a:ext uri="{909E8E84-426E-40DD-AFC4-6F175D3DCCD1}">
+              <a14:hiddenFill xmlns:a14="http://schemas.microsoft.com/office/drawing/2010/main">
+                <a:solidFill>
+                  <a:srgbClr val="FFFFFF"/>
+                </a:solidFill>
+              </a14:hiddenFill>
+            </a:ext>
+          </a:extLst>
+        </p:spPr>
+      </p:pic>
+    </p:spTree>
+    <p:extLst>
+      <p:ext uri="{BB962C8B-B14F-4D97-AF65-F5344CB8AC3E}">
+        <p14:creationId xmlns:p14="http://schemas.microsoft.com/office/powerpoint/2010/main" val="270900983"/>
+      </p:ext>
+    </p:extLst>
+  </p:cSld>
+  <p:clrMapOvr>
+    <a:masterClrMapping/>
+  </p:clrMapOvr>
+</p:sld>
+</file>
+
+<file path=ppt/slides/slide40.xml><?xml version="1.0" encoding="utf-8"?>
 <p:sld xmlns:a="http://schemas.openxmlformats.org/drawingml/2006/main" xmlns:r="http://schemas.openxmlformats.org/officeDocument/2006/relationships" xmlns:p="http://schemas.openxmlformats.org/presentationml/2006/main">
   <p:cSld>
     <p:spTree>
@@ -22327,412 +22960,7 @@
 </p:sld>
 </file>
 
-<file path=ppt/slides/slide4.xml><?xml version="1.0" encoding="utf-8"?>
-<p:sld xmlns:a="http://schemas.openxmlformats.org/drawingml/2006/main" xmlns:r="http://schemas.openxmlformats.org/officeDocument/2006/relationships" xmlns:p="http://schemas.openxmlformats.org/presentationml/2006/main">
-  <p:cSld>
-    <p:spTree>
-      <p:nvGrpSpPr>
-        <p:cNvPr id="1" name=""/>
-        <p:cNvGrpSpPr/>
-        <p:nvPr/>
-      </p:nvGrpSpPr>
-      <p:grpSpPr>
-        <a:xfrm>
-          <a:off x="0" y="0"/>
-          <a:ext cx="0" cy="0"/>
-          <a:chOff x="0" y="0"/>
-          <a:chExt cx="0" cy="0"/>
-        </a:xfrm>
-      </p:grpSpPr>
-      <p:sp>
-        <p:nvSpPr>
-          <p:cNvPr id="2" name="Content Placeholder 1">
-            <a:extLst>
-              <a:ext uri="{FF2B5EF4-FFF2-40B4-BE49-F238E27FC236}">
-                <a16:creationId xmlns:a16="http://schemas.microsoft.com/office/drawing/2014/main" id="{8ACF9742-3350-1D65-AB1F-E445C30B36DE}"/>
-              </a:ext>
-            </a:extLst>
-          </p:cNvPr>
-          <p:cNvSpPr>
-            <a:spLocks noGrp="1"/>
-          </p:cNvSpPr>
-          <p:nvPr>
-            <p:ph idx="1"/>
-          </p:nvPr>
-        </p:nvSpPr>
-        <p:spPr>
-          <a:xfrm>
-            <a:off x="360607" y="785004"/>
-            <a:ext cx="11449319" cy="5046453"/>
-          </a:xfrm>
-        </p:spPr>
-        <p:txBody>
-          <a:bodyPr/>
-          <a:lstStyle/>
-          <a:p>
-            <a:r>
-              <a:rPr lang="en-US"/>
-              <a:t>Objects have properties and functions</a:t>
-            </a:r>
-            <a:endParaRPr lang="en-US" dirty="0"/>
-          </a:p>
-        </p:txBody>
-      </p:sp>
-      <p:sp>
-        <p:nvSpPr>
-          <p:cNvPr id="3" name="Title 2">
-            <a:extLst>
-              <a:ext uri="{FF2B5EF4-FFF2-40B4-BE49-F238E27FC236}">
-                <a16:creationId xmlns:a16="http://schemas.microsoft.com/office/drawing/2014/main" id="{6BE0EAE0-FAB3-33AA-DB3C-DDC2394A80CD}"/>
-              </a:ext>
-            </a:extLst>
-          </p:cNvPr>
-          <p:cNvSpPr>
-            <a:spLocks noGrp="1"/>
-          </p:cNvSpPr>
-          <p:nvPr>
-            <p:ph type="title"/>
-          </p:nvPr>
-        </p:nvSpPr>
-        <p:spPr>
-          <a:xfrm>
-            <a:off x="0" y="0"/>
-            <a:ext cx="12192000" cy="696277"/>
-          </a:xfrm>
-        </p:spPr>
-        <p:txBody>
-          <a:bodyPr/>
-          <a:lstStyle/>
-          <a:p>
-            <a:r>
-              <a:rPr lang="en-US"/>
-              <a:t>What is an object?</a:t>
-            </a:r>
-            <a:endParaRPr lang="en-US" dirty="0"/>
-          </a:p>
-        </p:txBody>
-      </p:sp>
-      <p:sp>
-        <p:nvSpPr>
-          <p:cNvPr id="7" name="Subtitle 6">
-            <a:extLst>
-              <a:ext uri="{FF2B5EF4-FFF2-40B4-BE49-F238E27FC236}">
-                <a16:creationId xmlns:a16="http://schemas.microsoft.com/office/drawing/2014/main" id="{CE9159A9-FF0A-B8E9-0C14-2B159D3C6BA6}"/>
-              </a:ext>
-            </a:extLst>
-          </p:cNvPr>
-          <p:cNvSpPr>
-            <a:spLocks noGrp="1"/>
-          </p:cNvSpPr>
-          <p:nvPr>
-            <p:ph type="subTitle" idx="13"/>
-          </p:nvPr>
-        </p:nvSpPr>
-        <p:spPr/>
-        <p:txBody>
-          <a:bodyPr/>
-          <a:lstStyle/>
-          <a:p>
-            <a:endParaRPr lang="en-US"/>
-          </a:p>
-        </p:txBody>
-      </p:sp>
-      <p:pic>
-        <p:nvPicPr>
-          <p:cNvPr id="1026" name="Picture 2" descr="Best Cars of 2024 and 2025 - Top-Rated New Cars Ranked | KBB.com">
-            <a:extLst>
-              <a:ext uri="{FF2B5EF4-FFF2-40B4-BE49-F238E27FC236}">
-                <a16:creationId xmlns:a16="http://schemas.microsoft.com/office/drawing/2014/main" id="{D0B3A394-D3F6-ACDF-9E4D-40D79040B9C8}"/>
-              </a:ext>
-            </a:extLst>
-          </p:cNvPr>
-          <p:cNvPicPr>
-            <a:picLocks noChangeAspect="1" noChangeArrowheads="1"/>
-          </p:cNvPicPr>
-          <p:nvPr/>
-        </p:nvPicPr>
-        <p:blipFill>
-          <a:blip r:embed="rId3" cstate="print">
-            <a:extLst>
-              <a:ext uri="{28A0092B-C50C-407E-A947-70E740481C1C}">
-                <a14:useLocalDpi xmlns:a14="http://schemas.microsoft.com/office/drawing/2010/main" val="0"/>
-              </a:ext>
-            </a:extLst>
-          </a:blip>
-          <a:srcRect/>
-          <a:stretch>
-            <a:fillRect/>
-          </a:stretch>
-        </p:blipFill>
-        <p:spPr bwMode="auto">
-          <a:xfrm>
-            <a:off x="529940" y="1598124"/>
-            <a:ext cx="3330859" cy="1347957"/>
-          </a:xfrm>
-          <a:prstGeom prst="rect">
-            <a:avLst/>
-          </a:prstGeom>
-          <a:noFill/>
-          <a:extLst>
-            <a:ext uri="{909E8E84-426E-40DD-AFC4-6F175D3DCCD1}">
-              <a14:hiddenFill xmlns:a14="http://schemas.microsoft.com/office/drawing/2010/main">
-                <a:solidFill>
-                  <a:srgbClr val="FFFFFF"/>
-                </a:solidFill>
-              </a14:hiddenFill>
-            </a:ext>
-          </a:extLst>
-        </p:spPr>
-      </p:pic>
-      <p:pic>
-        <p:nvPicPr>
-          <p:cNvPr id="1028" name="Picture 4" descr="Understanding Behavioral Changes in Senior Dogs | Dog Aging Project">
-            <a:extLst>
-              <a:ext uri="{FF2B5EF4-FFF2-40B4-BE49-F238E27FC236}">
-                <a16:creationId xmlns:a16="http://schemas.microsoft.com/office/drawing/2014/main" id="{5812A8B1-EF6D-9DC6-4052-4E8A1E1A83C7}"/>
-              </a:ext>
-            </a:extLst>
-          </p:cNvPr>
-          <p:cNvPicPr>
-            <a:picLocks noChangeAspect="1" noChangeArrowheads="1"/>
-          </p:cNvPicPr>
-          <p:nvPr/>
-        </p:nvPicPr>
-        <p:blipFill>
-          <a:blip r:embed="rId4" cstate="print">
-            <a:extLst>
-              <a:ext uri="{28A0092B-C50C-407E-A947-70E740481C1C}">
-                <a14:useLocalDpi xmlns:a14="http://schemas.microsoft.com/office/drawing/2010/main" val="0"/>
-              </a:ext>
-            </a:extLst>
-          </a:blip>
-          <a:srcRect/>
-          <a:stretch>
-            <a:fillRect/>
-          </a:stretch>
-        </p:blipFill>
-        <p:spPr bwMode="auto">
-          <a:xfrm>
-            <a:off x="827897" y="3831255"/>
-            <a:ext cx="2575454" cy="1717234"/>
-          </a:xfrm>
-          <a:prstGeom prst="rect">
-            <a:avLst/>
-          </a:prstGeom>
-          <a:noFill/>
-          <a:extLst>
-            <a:ext uri="{909E8E84-426E-40DD-AFC4-6F175D3DCCD1}">
-              <a14:hiddenFill xmlns:a14="http://schemas.microsoft.com/office/drawing/2010/main">
-                <a:solidFill>
-                  <a:srgbClr val="FFFFFF"/>
-                </a:solidFill>
-              </a14:hiddenFill>
-            </a:ext>
-          </a:extLst>
-        </p:spPr>
-      </p:pic>
-      <p:pic>
-        <p:nvPicPr>
-          <p:cNvPr id="1030" name="Picture 6" descr="Professional Woman Stock Photos, Images and Backgrounds for Free Download">
-            <a:extLst>
-              <a:ext uri="{FF2B5EF4-FFF2-40B4-BE49-F238E27FC236}">
-                <a16:creationId xmlns:a16="http://schemas.microsoft.com/office/drawing/2014/main" id="{C5D996F2-8637-3CFD-2B62-E4DDFD288786}"/>
-              </a:ext>
-            </a:extLst>
-          </p:cNvPr>
-          <p:cNvPicPr>
-            <a:picLocks noChangeAspect="1" noChangeArrowheads="1"/>
-          </p:cNvPicPr>
-          <p:nvPr/>
-        </p:nvPicPr>
-        <p:blipFill>
-          <a:blip r:embed="rId5" cstate="print">
-            <a:extLst>
-              <a:ext uri="{28A0092B-C50C-407E-A947-70E740481C1C}">
-                <a14:useLocalDpi xmlns:a14="http://schemas.microsoft.com/office/drawing/2010/main" val="0"/>
-              </a:ext>
-            </a:extLst>
-          </a:blip>
-          <a:srcRect/>
-          <a:stretch>
-            <a:fillRect/>
-          </a:stretch>
-        </p:blipFill>
-        <p:spPr bwMode="auto">
-          <a:xfrm>
-            <a:off x="4797539" y="1357433"/>
-            <a:ext cx="2575454" cy="1931255"/>
-          </a:xfrm>
-          <a:prstGeom prst="rect">
-            <a:avLst/>
-          </a:prstGeom>
-          <a:noFill/>
-          <a:extLst>
-            <a:ext uri="{909E8E84-426E-40DD-AFC4-6F175D3DCCD1}">
-              <a14:hiddenFill xmlns:a14="http://schemas.microsoft.com/office/drawing/2010/main">
-                <a:solidFill>
-                  <a:srgbClr val="FFFFFF"/>
-                </a:solidFill>
-              </a14:hiddenFill>
-            </a:ext>
-          </a:extLst>
-        </p:spPr>
-      </p:pic>
-      <p:pic>
-        <p:nvPicPr>
-          <p:cNvPr id="1032" name="Picture 8" descr="Roll: Bicycle Company A:1 Adventure Bike">
-            <a:extLst>
-              <a:ext uri="{FF2B5EF4-FFF2-40B4-BE49-F238E27FC236}">
-                <a16:creationId xmlns:a16="http://schemas.microsoft.com/office/drawing/2014/main" id="{A6DEBE71-9A16-E558-68CA-3DBB9959789B}"/>
-              </a:ext>
-            </a:extLst>
-          </p:cNvPr>
-          <p:cNvPicPr>
-            <a:picLocks noChangeAspect="1" noChangeArrowheads="1"/>
-          </p:cNvPicPr>
-          <p:nvPr/>
-        </p:nvPicPr>
-        <p:blipFill>
-          <a:blip r:embed="rId6" cstate="print">
-            <a:extLst>
-              <a:ext uri="{28A0092B-C50C-407E-A947-70E740481C1C}">
-                <a14:useLocalDpi xmlns:a14="http://schemas.microsoft.com/office/drawing/2010/main" val="0"/>
-              </a:ext>
-            </a:extLst>
-          </a:blip>
-          <a:srcRect/>
-          <a:stretch>
-            <a:fillRect/>
-          </a:stretch>
-        </p:blipFill>
-        <p:spPr bwMode="auto">
-          <a:xfrm>
-            <a:off x="8267644" y="3503877"/>
-            <a:ext cx="3527778" cy="2116667"/>
-          </a:xfrm>
-          <a:prstGeom prst="rect">
-            <a:avLst/>
-          </a:prstGeom>
-          <a:noFill/>
-          <a:extLst>
-            <a:ext uri="{909E8E84-426E-40DD-AFC4-6F175D3DCCD1}">
-              <a14:hiddenFill xmlns:a14="http://schemas.microsoft.com/office/drawing/2010/main">
-                <a:solidFill>
-                  <a:srgbClr val="FFFFFF"/>
-                </a:solidFill>
-              </a14:hiddenFill>
-            </a:ext>
-          </a:extLst>
-        </p:spPr>
-      </p:pic>
-      <p:pic>
-        <p:nvPicPr>
-          <p:cNvPr id="1034" name="Picture 10" descr="True Fine 16.5-in Brushed Steel LED Touch Table Lamp with Fabric Shade  20080T-BN at Lowes.com">
-            <a:extLst>
-              <a:ext uri="{FF2B5EF4-FFF2-40B4-BE49-F238E27FC236}">
-                <a16:creationId xmlns:a16="http://schemas.microsoft.com/office/drawing/2014/main" id="{B33B9FBE-636D-877F-1CA6-7513A4E829B6}"/>
-              </a:ext>
-            </a:extLst>
-          </p:cNvPr>
-          <p:cNvPicPr>
-            <a:picLocks noChangeAspect="1" noChangeArrowheads="1"/>
-          </p:cNvPicPr>
-          <p:nvPr/>
-        </p:nvPicPr>
-        <p:blipFill>
-          <a:blip r:embed="rId7" cstate="print">
-            <a:extLst>
-              <a:ext uri="{28A0092B-C50C-407E-A947-70E740481C1C}">
-                <a14:useLocalDpi xmlns:a14="http://schemas.microsoft.com/office/drawing/2010/main" val="0"/>
-              </a:ext>
-            </a:extLst>
-          </a:blip>
-          <a:srcRect/>
-          <a:stretch>
-            <a:fillRect/>
-          </a:stretch>
-        </p:blipFill>
-        <p:spPr bwMode="auto">
-          <a:xfrm>
-            <a:off x="9033822" y="1344072"/>
-            <a:ext cx="1995422" cy="1995422"/>
-          </a:xfrm>
-          <a:prstGeom prst="rect">
-            <a:avLst/>
-          </a:prstGeom>
-          <a:noFill/>
-          <a:extLst>
-            <a:ext uri="{909E8E84-426E-40DD-AFC4-6F175D3DCCD1}">
-              <a14:hiddenFill xmlns:a14="http://schemas.microsoft.com/office/drawing/2010/main">
-                <a:solidFill>
-                  <a:srgbClr val="FFFFFF"/>
-                </a:solidFill>
-              </a14:hiddenFill>
-            </a:ext>
-          </a:extLst>
-        </p:spPr>
-      </p:pic>
-      <p:pic>
-        <p:nvPicPr>
-          <p:cNvPr id="1036" name="Picture 12" descr="Twinkle Twinkle Little Firefly - Humane Gardener">
-            <a:extLst>
-              <a:ext uri="{FF2B5EF4-FFF2-40B4-BE49-F238E27FC236}">
-                <a16:creationId xmlns:a16="http://schemas.microsoft.com/office/drawing/2014/main" id="{DA3A625C-BA86-22D3-9AF0-985AA2A6F3A0}"/>
-              </a:ext>
-            </a:extLst>
-          </p:cNvPr>
-          <p:cNvPicPr>
-            <a:picLocks noChangeAspect="1" noChangeArrowheads="1"/>
-          </p:cNvPicPr>
-          <p:nvPr/>
-        </p:nvPicPr>
-        <p:blipFill>
-          <a:blip r:embed="rId8" cstate="print">
-            <a:extLst>
-              <a:ext uri="{28A0092B-C50C-407E-A947-70E740481C1C}">
-                <a14:useLocalDpi xmlns:a14="http://schemas.microsoft.com/office/drawing/2010/main" val="0"/>
-              </a:ext>
-            </a:extLst>
-          </a:blip>
-          <a:srcRect/>
-          <a:stretch>
-            <a:fillRect/>
-          </a:stretch>
-        </p:blipFill>
-        <p:spPr bwMode="auto">
-          <a:xfrm>
-            <a:off x="4606579" y="3677531"/>
-            <a:ext cx="3330859" cy="1873175"/>
-          </a:xfrm>
-          <a:prstGeom prst="rect">
-            <a:avLst/>
-          </a:prstGeom>
-          <a:noFill/>
-          <a:extLst>
-            <a:ext uri="{909E8E84-426E-40DD-AFC4-6F175D3DCCD1}">
-              <a14:hiddenFill xmlns:a14="http://schemas.microsoft.com/office/drawing/2010/main">
-                <a:solidFill>
-                  <a:srgbClr val="FFFFFF"/>
-                </a:solidFill>
-              </a14:hiddenFill>
-            </a:ext>
-          </a:extLst>
-        </p:spPr>
-      </p:pic>
-    </p:spTree>
-    <p:extLst>
-      <p:ext uri="{BB962C8B-B14F-4D97-AF65-F5344CB8AC3E}">
-        <p14:creationId xmlns:p14="http://schemas.microsoft.com/office/powerpoint/2010/main" val="270900983"/>
-      </p:ext>
-    </p:extLst>
-  </p:cSld>
-  <p:clrMapOvr>
-    <a:masterClrMapping/>
-  </p:clrMapOvr>
-</p:sld>
-</file>
-
-<file path=ppt/slides/slide40.xml><?xml version="1.0" encoding="utf-8"?>
+<file path=ppt/slides/slide41.xml><?xml version="1.0" encoding="utf-8"?>
 <p:sld xmlns:a="http://schemas.openxmlformats.org/drawingml/2006/main" xmlns:r="http://schemas.openxmlformats.org/officeDocument/2006/relationships" xmlns:p="http://schemas.openxmlformats.org/presentationml/2006/main">
   <p:cSld>
     <p:spTree>
@@ -23780,7 +24008,7 @@
 </p:sld>
 </file>
 
-<file path=ppt/slides/slide41.xml><?xml version="1.0" encoding="utf-8"?>
+<file path=ppt/slides/slide42.xml><?xml version="1.0" encoding="utf-8"?>
 <p:sld xmlns:a="http://schemas.openxmlformats.org/drawingml/2006/main" xmlns:r="http://schemas.openxmlformats.org/officeDocument/2006/relationships" xmlns:p="http://schemas.openxmlformats.org/presentationml/2006/main">
   <p:cSld>
     <p:spTree>
@@ -23958,7 +24186,115 @@
 </p:sld>
 </file>
 
-<file path=ppt/slides/slide42.xml><?xml version="1.0" encoding="utf-8"?>
+<file path=ppt/slides/slide43.xml><?xml version="1.0" encoding="utf-8"?>
+<p:sld xmlns:a="http://schemas.openxmlformats.org/drawingml/2006/main" xmlns:r="http://schemas.openxmlformats.org/officeDocument/2006/relationships" xmlns:p="http://schemas.openxmlformats.org/presentationml/2006/main">
+  <p:cSld>
+    <p:spTree>
+      <p:nvGrpSpPr>
+        <p:cNvPr id="1" name=""/>
+        <p:cNvGrpSpPr/>
+        <p:nvPr/>
+      </p:nvGrpSpPr>
+      <p:grpSpPr>
+        <a:xfrm>
+          <a:off x="0" y="0"/>
+          <a:ext cx="0" cy="0"/>
+          <a:chOff x="0" y="0"/>
+          <a:chExt cx="0" cy="0"/>
+        </a:xfrm>
+      </p:grpSpPr>
+      <p:sp>
+        <p:nvSpPr>
+          <p:cNvPr id="2" name="Content Placeholder 1">
+            <a:extLst>
+              <a:ext uri="{FF2B5EF4-FFF2-40B4-BE49-F238E27FC236}">
+                <a16:creationId xmlns:a16="http://schemas.microsoft.com/office/drawing/2014/main" id="{A4380504-F2B0-3BC8-121B-E745A513446E}"/>
+              </a:ext>
+            </a:extLst>
+          </p:cNvPr>
+          <p:cNvSpPr>
+            <a:spLocks noGrp="1"/>
+          </p:cNvSpPr>
+          <p:nvPr>
+            <p:ph idx="1"/>
+          </p:nvPr>
+        </p:nvSpPr>
+        <p:spPr/>
+        <p:txBody>
+          <a:bodyPr/>
+          <a:lstStyle/>
+          <a:p>
+            <a:endParaRPr lang="en-US" dirty="0"/>
+          </a:p>
+        </p:txBody>
+      </p:sp>
+      <p:sp>
+        <p:nvSpPr>
+          <p:cNvPr id="3" name="Title 2">
+            <a:extLst>
+              <a:ext uri="{FF2B5EF4-FFF2-40B4-BE49-F238E27FC236}">
+                <a16:creationId xmlns:a16="http://schemas.microsoft.com/office/drawing/2014/main" id="{38D8D1CF-40D8-4B2E-030C-BDC04AA2D74C}"/>
+              </a:ext>
+            </a:extLst>
+          </p:cNvPr>
+          <p:cNvSpPr>
+            <a:spLocks noGrp="1"/>
+          </p:cNvSpPr>
+          <p:nvPr>
+            <p:ph type="title"/>
+          </p:nvPr>
+        </p:nvSpPr>
+        <p:spPr/>
+        <p:txBody>
+          <a:bodyPr/>
+          <a:lstStyle/>
+          <a:p>
+            <a:r>
+              <a:rPr lang="en-US" dirty="0"/>
+              <a:t>Types of memory</a:t>
+            </a:r>
+          </a:p>
+        </p:txBody>
+      </p:sp>
+      <p:sp>
+        <p:nvSpPr>
+          <p:cNvPr id="4" name="Subtitle 3">
+            <a:extLst>
+              <a:ext uri="{FF2B5EF4-FFF2-40B4-BE49-F238E27FC236}">
+                <a16:creationId xmlns:a16="http://schemas.microsoft.com/office/drawing/2014/main" id="{9CA03C7A-A774-D912-A8A8-E346EEB0CB8B}"/>
+              </a:ext>
+            </a:extLst>
+          </p:cNvPr>
+          <p:cNvSpPr>
+            <a:spLocks noGrp="1"/>
+          </p:cNvSpPr>
+          <p:nvPr>
+            <p:ph type="subTitle" idx="13"/>
+          </p:nvPr>
+        </p:nvSpPr>
+        <p:spPr/>
+        <p:txBody>
+          <a:bodyPr/>
+          <a:lstStyle/>
+          <a:p>
+            <a:endParaRPr lang="en-US"/>
+          </a:p>
+        </p:txBody>
+      </p:sp>
+    </p:spTree>
+    <p:extLst>
+      <p:ext uri="{BB962C8B-B14F-4D97-AF65-F5344CB8AC3E}">
+        <p14:creationId xmlns:p14="http://schemas.microsoft.com/office/powerpoint/2010/main" val="469281232"/>
+      </p:ext>
+    </p:extLst>
+  </p:cSld>
+  <p:clrMapOvr>
+    <a:masterClrMapping/>
+  </p:clrMapOvr>
+</p:sld>
+</file>
+
+<file path=ppt/slides/slide44.xml><?xml version="1.0" encoding="utf-8"?>
 <p:sld xmlns:a="http://schemas.openxmlformats.org/drawingml/2006/main" xmlns:r="http://schemas.openxmlformats.org/officeDocument/2006/relationships" xmlns:p="http://schemas.openxmlformats.org/presentationml/2006/main" show="0">
   <p:cSld>
     <p:spTree>
@@ -24824,7 +25160,7 @@
 </p:sld>
 </file>
 
-<file path=ppt/slides/slide43.xml><?xml version="1.0" encoding="utf-8"?>
+<file path=ppt/slides/slide45.xml><?xml version="1.0" encoding="utf-8"?>
 <p:sld xmlns:a="http://schemas.openxmlformats.org/drawingml/2006/main" xmlns:r="http://schemas.openxmlformats.org/officeDocument/2006/relationships" xmlns:p="http://schemas.openxmlformats.org/presentationml/2006/main" show="0">
   <p:cSld>
     <p:spTree>
@@ -26304,6 +26640,218 @@
           </a:p>
         </p:txBody>
       </p:sp>
+      <p:sp>
+        <p:nvSpPr>
+          <p:cNvPr id="2" name="Rectangle 1">
+            <a:extLst>
+              <a:ext uri="{FF2B5EF4-FFF2-40B4-BE49-F238E27FC236}">
+                <a16:creationId xmlns:a16="http://schemas.microsoft.com/office/drawing/2014/main" id="{9C573C7E-6459-9E70-66D9-B94B445816AC}"/>
+              </a:ext>
+            </a:extLst>
+          </p:cNvPr>
+          <p:cNvSpPr/>
+          <p:nvPr/>
+        </p:nvSpPr>
+        <p:spPr>
+          <a:xfrm>
+            <a:off x="6824261" y="3308230"/>
+            <a:ext cx="958065" cy="430281"/>
+          </a:xfrm>
+          <a:prstGeom prst="rect">
+            <a:avLst/>
+          </a:prstGeom>
+          <a:noFill/>
+          <a:ln w="34925" cap="flat" cmpd="sng" algn="ctr">
+            <a:solidFill>
+              <a:schemeClr val="accent1"/>
+            </a:solidFill>
+            <a:prstDash val="solid"/>
+            <a:round/>
+            <a:headEnd type="none" w="med" len="med"/>
+            <a:tailEnd type="none" w="med" len="med"/>
+          </a:ln>
+        </p:spPr>
+        <p:style>
+          <a:lnRef idx="0">
+            <a:scrgbClr r="0" g="0" b="0"/>
+          </a:lnRef>
+          <a:fillRef idx="0">
+            <a:scrgbClr r="0" g="0" b="0"/>
+          </a:fillRef>
+          <a:effectRef idx="0">
+            <a:scrgbClr r="0" g="0" b="0"/>
+          </a:effectRef>
+          <a:fontRef idx="minor">
+            <a:schemeClr val="accent1"/>
+          </a:fontRef>
+        </p:style>
+        <p:txBody>
+          <a:bodyPr rot="0" spcFirstLastPara="0" vertOverflow="overflow" horzOverflow="overflow" vert="horz" wrap="square" lIns="91440" tIns="45720" rIns="91440" bIns="45720" numCol="1" spcCol="0" rtlCol="0" fromWordArt="0" anchor="ctr" anchorCtr="0" forceAA="0" compatLnSpc="1">
+            <a:prstTxWarp prst="textNoShape">
+              <a:avLst/>
+            </a:prstTxWarp>
+            <a:noAutofit/>
+          </a:bodyPr>
+          <a:lstStyle/>
+          <a:p>
+            <a:pPr algn="ctr"/>
+            <a:endParaRPr lang="en-US" dirty="0">
+              <a:ln w="0"/>
+              <a:solidFill>
+                <a:schemeClr val="tx1"/>
+              </a:solidFill>
+              <a:effectLst>
+                <a:outerShdw blurRad="38100" dist="19050" dir="2700000" algn="tl" rotWithShape="0">
+                  <a:schemeClr val="dk1">
+                    <a:alpha val="40000"/>
+                  </a:schemeClr>
+                </a:outerShdw>
+              </a:effectLst>
+            </a:endParaRPr>
+          </a:p>
+        </p:txBody>
+      </p:sp>
+      <p:sp>
+        <p:nvSpPr>
+          <p:cNvPr id="4" name="Rectangle 3">
+            <a:extLst>
+              <a:ext uri="{FF2B5EF4-FFF2-40B4-BE49-F238E27FC236}">
+                <a16:creationId xmlns:a16="http://schemas.microsoft.com/office/drawing/2014/main" id="{4E60E7B5-B7E4-2D07-0432-90CD04022487}"/>
+              </a:ext>
+            </a:extLst>
+          </p:cNvPr>
+          <p:cNvSpPr/>
+          <p:nvPr/>
+        </p:nvSpPr>
+        <p:spPr>
+          <a:xfrm>
+            <a:off x="7939008" y="3308229"/>
+            <a:ext cx="958065" cy="430281"/>
+          </a:xfrm>
+          <a:prstGeom prst="rect">
+            <a:avLst/>
+          </a:prstGeom>
+          <a:noFill/>
+          <a:ln w="34925" cap="flat" cmpd="sng" algn="ctr">
+            <a:solidFill>
+              <a:schemeClr val="accent1"/>
+            </a:solidFill>
+            <a:prstDash val="solid"/>
+            <a:round/>
+            <a:headEnd type="none" w="med" len="med"/>
+            <a:tailEnd type="none" w="med" len="med"/>
+          </a:ln>
+        </p:spPr>
+        <p:style>
+          <a:lnRef idx="0">
+            <a:scrgbClr r="0" g="0" b="0"/>
+          </a:lnRef>
+          <a:fillRef idx="0">
+            <a:scrgbClr r="0" g="0" b="0"/>
+          </a:fillRef>
+          <a:effectRef idx="0">
+            <a:scrgbClr r="0" g="0" b="0"/>
+          </a:effectRef>
+          <a:fontRef idx="minor">
+            <a:schemeClr val="accent1"/>
+          </a:fontRef>
+        </p:style>
+        <p:txBody>
+          <a:bodyPr rot="0" spcFirstLastPara="0" vertOverflow="overflow" horzOverflow="overflow" vert="horz" wrap="square" lIns="91440" tIns="45720" rIns="91440" bIns="45720" numCol="1" spcCol="0" rtlCol="0" fromWordArt="0" anchor="ctr" anchorCtr="0" forceAA="0" compatLnSpc="1">
+            <a:prstTxWarp prst="textNoShape">
+              <a:avLst/>
+            </a:prstTxWarp>
+            <a:noAutofit/>
+          </a:bodyPr>
+          <a:lstStyle/>
+          <a:p>
+            <a:pPr algn="ctr"/>
+            <a:endParaRPr lang="en-US" dirty="0">
+              <a:ln w="0"/>
+              <a:solidFill>
+                <a:schemeClr val="tx1"/>
+              </a:solidFill>
+              <a:effectLst>
+                <a:outerShdw blurRad="38100" dist="19050" dir="2700000" algn="tl" rotWithShape="0">
+                  <a:schemeClr val="dk1">
+                    <a:alpha val="40000"/>
+                  </a:schemeClr>
+                </a:outerShdw>
+              </a:effectLst>
+            </a:endParaRPr>
+          </a:p>
+        </p:txBody>
+      </p:sp>
+      <p:sp>
+        <p:nvSpPr>
+          <p:cNvPr id="5" name="TextBox 4">
+            <a:extLst>
+              <a:ext uri="{FF2B5EF4-FFF2-40B4-BE49-F238E27FC236}">
+                <a16:creationId xmlns:a16="http://schemas.microsoft.com/office/drawing/2014/main" id="{5C4FDAB1-4191-1BA6-86BD-FA7BAD9F11CF}"/>
+              </a:ext>
+            </a:extLst>
+          </p:cNvPr>
+          <p:cNvSpPr txBox="1"/>
+          <p:nvPr/>
+        </p:nvSpPr>
+        <p:spPr>
+          <a:xfrm>
+            <a:off x="6667579" y="3821985"/>
+            <a:ext cx="1238159" cy="400110"/>
+          </a:xfrm>
+          <a:prstGeom prst="rect">
+            <a:avLst/>
+          </a:prstGeom>
+          <a:noFill/>
+        </p:spPr>
+        <p:txBody>
+          <a:bodyPr wrap="none" rtlCol="0">
+            <a:spAutoFit/>
+          </a:bodyPr>
+          <a:lstStyle/>
+          <a:p>
+            <a:r>
+              <a:rPr lang="en-US" sz="2000" b="1" i="1" dirty="0"/>
+              <a:t>Reference</a:t>
+            </a:r>
+          </a:p>
+        </p:txBody>
+      </p:sp>
+      <p:sp>
+        <p:nvSpPr>
+          <p:cNvPr id="6" name="TextBox 5">
+            <a:extLst>
+              <a:ext uri="{FF2B5EF4-FFF2-40B4-BE49-F238E27FC236}">
+                <a16:creationId xmlns:a16="http://schemas.microsoft.com/office/drawing/2014/main" id="{CB42ED99-D662-A210-756E-BCF59839D874}"/>
+              </a:ext>
+            </a:extLst>
+          </p:cNvPr>
+          <p:cNvSpPr txBox="1"/>
+          <p:nvPr/>
+        </p:nvSpPr>
+        <p:spPr>
+          <a:xfrm>
+            <a:off x="7939008" y="3823326"/>
+            <a:ext cx="877163" cy="400110"/>
+          </a:xfrm>
+          <a:prstGeom prst="rect">
+            <a:avLst/>
+          </a:prstGeom>
+          <a:noFill/>
+        </p:spPr>
+        <p:txBody>
+          <a:bodyPr wrap="none" rtlCol="0">
+            <a:spAutoFit/>
+          </a:bodyPr>
+          <a:lstStyle/>
+          <a:p>
+            <a:r>
+              <a:rPr lang="en-US" sz="2000" b="1" i="1" dirty="0"/>
+              <a:t>Object</a:t>
+            </a:r>
+          </a:p>
+        </p:txBody>
+      </p:sp>
     </p:spTree>
     <p:extLst>
       <p:ext uri="{BB962C8B-B14F-4D97-AF65-F5344CB8AC3E}">
@@ -26484,6 +27032,132 @@
                       </p:childTnLst>
                     </p:cTn>
                   </p:par>
+                  <p:par>
+                    <p:cTn id="17" fill="hold">
+                      <p:stCondLst>
+                        <p:cond delay="indefinite"/>
+                      </p:stCondLst>
+                      <p:childTnLst>
+                        <p:par>
+                          <p:cTn id="18" fill="hold">
+                            <p:stCondLst>
+                              <p:cond delay="0"/>
+                            </p:stCondLst>
+                            <p:childTnLst>
+                              <p:par>
+                                <p:cTn id="19" presetID="1" presetClass="entr" presetSubtype="0" fill="hold" grpId="0" nodeType="clickEffect">
+                                  <p:stCondLst>
+                                    <p:cond delay="0"/>
+                                  </p:stCondLst>
+                                  <p:childTnLst>
+                                    <p:set>
+                                      <p:cBhvr>
+                                        <p:cTn id="20" dur="1" fill="hold">
+                                          <p:stCondLst>
+                                            <p:cond delay="0"/>
+                                          </p:stCondLst>
+                                        </p:cTn>
+                                        <p:tgtEl>
+                                          <p:spTgt spid="2"/>
+                                        </p:tgtEl>
+                                        <p:attrNameLst>
+                                          <p:attrName>style.visibility</p:attrName>
+                                        </p:attrNameLst>
+                                      </p:cBhvr>
+                                      <p:to>
+                                        <p:strVal val="visible"/>
+                                      </p:to>
+                                    </p:set>
+                                  </p:childTnLst>
+                                </p:cTn>
+                              </p:par>
+                              <p:par>
+                                <p:cTn id="21" presetID="1" presetClass="entr" presetSubtype="0" fill="hold" grpId="0" nodeType="withEffect">
+                                  <p:stCondLst>
+                                    <p:cond delay="0"/>
+                                  </p:stCondLst>
+                                  <p:childTnLst>
+                                    <p:set>
+                                      <p:cBhvr>
+                                        <p:cTn id="22" dur="1" fill="hold">
+                                          <p:stCondLst>
+                                            <p:cond delay="0"/>
+                                          </p:stCondLst>
+                                        </p:cTn>
+                                        <p:tgtEl>
+                                          <p:spTgt spid="4"/>
+                                        </p:tgtEl>
+                                        <p:attrNameLst>
+                                          <p:attrName>style.visibility</p:attrName>
+                                        </p:attrNameLst>
+                                      </p:cBhvr>
+                                      <p:to>
+                                        <p:strVal val="visible"/>
+                                      </p:to>
+                                    </p:set>
+                                  </p:childTnLst>
+                                </p:cTn>
+                              </p:par>
+                              <p:par>
+                                <p:cTn id="23" presetID="1" presetClass="entr" presetSubtype="0" fill="hold" grpId="0" nodeType="withEffect">
+                                  <p:stCondLst>
+                                    <p:cond delay="0"/>
+                                  </p:stCondLst>
+                                  <p:childTnLst>
+                                    <p:set>
+                                      <p:cBhvr>
+                                        <p:cTn id="24" dur="1" fill="hold">
+                                          <p:stCondLst>
+                                            <p:cond delay="0"/>
+                                          </p:stCondLst>
+                                        </p:cTn>
+                                        <p:tgtEl>
+                                          <p:spTgt spid="5"/>
+                                        </p:tgtEl>
+                                        <p:attrNameLst>
+                                          <p:attrName>style.visibility</p:attrName>
+                                        </p:attrNameLst>
+                                      </p:cBhvr>
+                                      <p:to>
+                                        <p:strVal val="visible"/>
+                                      </p:to>
+                                    </p:set>
+                                  </p:childTnLst>
+                                </p:cTn>
+                              </p:par>
+                              <p:par>
+                                <p:cTn id="25" presetID="1" presetClass="entr" presetSubtype="0" fill="hold" grpId="0" nodeType="withEffect">
+                                  <p:stCondLst>
+                                    <p:cond delay="0"/>
+                                  </p:stCondLst>
+                                  <p:childTnLst>
+                                    <p:set>
+                                      <p:cBhvr>
+                                        <p:cTn id="26" dur="1" fill="hold">
+                                          <p:stCondLst>
+                                            <p:cond delay="0"/>
+                                          </p:stCondLst>
+                                        </p:cTn>
+                                        <p:tgtEl>
+                                          <p:spTgt spid="6"/>
+                                        </p:tgtEl>
+                                        <p:attrNameLst>
+                                          <p:attrName>style.visibility</p:attrName>
+                                        </p:attrNameLst>
+                                      </p:cBhvr>
+                                      <p:to>
+                                        <p:strVal val="visible"/>
+                                      </p:to>
+                                    </p:set>
+                                  </p:childTnLst>
+                                </p:cTn>
+                              </p:par>
+                            </p:childTnLst>
+                          </p:cTn>
+                        </p:par>
+                      </p:childTnLst>
+                    </p:cTn>
+                  </p:par>
                 </p:childTnLst>
               </p:cTn>
               <p:prevCondLst>
@@ -26510,6 +27184,10 @@
       <p:bldP spid="12" grpId="1" animBg="1"/>
       <p:bldP spid="14" grpId="0" animBg="1"/>
       <p:bldP spid="14" grpId="1" animBg="1"/>
+      <p:bldP spid="2" grpId="0" animBg="1"/>
+      <p:bldP spid="4" grpId="0" animBg="1"/>
+      <p:bldP spid="5" grpId="0"/>
+      <p:bldP spid="6" grpId="0"/>
     </p:bldLst>
   </p:timing>
 </p:sld>

</xml_diff>

<commit_message>
update Github API and json slides
</commit_message>
<xml_diff>
--- a/slides/2_oo_background.pptx
+++ b/slides/2_oo_background.pptx
@@ -23683,6 +23683,24 @@
             </a:r>
           </a:p>
           <a:p>
+            <a:pPr lvl="1"/>
+            <a:r>
+              <a:rPr lang="en-US" dirty="0"/>
+              <a:t>Up </a:t>
+            </a:r>
+            <a:r>
+              <a:rPr lang="en-US"/>
+              <a:t>to Oct 10</a:t>
+            </a:r>
+            <a:endParaRPr lang="en-US" dirty="0"/>
+          </a:p>
+          <a:p>
+            <a:r>
+              <a:rPr lang="en-US" dirty="0"/>
+              <a:t>Will add more “hints”</a:t>
+            </a:r>
+          </a:p>
+          <a:p>
             <a:endParaRPr lang="en-US" dirty="0"/>
           </a:p>
         </p:txBody>

</xml_diff>